<commit_message>
update @jerrodanzalone's session 3 slides
</commit_message>
<xml_diff>
--- a/lessons/session-3/Session3.pptx
+++ b/lessons/session-3/Session3.pptx
@@ -5,7 +5,7 @@
     <p:sldMasterId id="2147483737" r:id="rId1"/>
   </p:sldMasterIdLst>
   <p:notesMasterIdLst>
-    <p:notesMasterId r:id="rId39"/>
+    <p:notesMasterId r:id="rId40"/>
   </p:notesMasterIdLst>
   <p:sldIdLst>
     <p:sldId id="262" r:id="rId2"/>
@@ -35,16 +35,17 @@
     <p:sldId id="304" r:id="rId26"/>
     <p:sldId id="302" r:id="rId27"/>
     <p:sldId id="303" r:id="rId28"/>
-    <p:sldId id="305" r:id="rId29"/>
-    <p:sldId id="306" r:id="rId30"/>
-    <p:sldId id="308" r:id="rId31"/>
-    <p:sldId id="307" r:id="rId32"/>
-    <p:sldId id="309" r:id="rId33"/>
-    <p:sldId id="312" r:id="rId34"/>
-    <p:sldId id="310" r:id="rId35"/>
-    <p:sldId id="311" r:id="rId36"/>
-    <p:sldId id="313" r:id="rId37"/>
-    <p:sldId id="258" r:id="rId38"/>
+    <p:sldId id="314" r:id="rId29"/>
+    <p:sldId id="305" r:id="rId30"/>
+    <p:sldId id="306" r:id="rId31"/>
+    <p:sldId id="308" r:id="rId32"/>
+    <p:sldId id="307" r:id="rId33"/>
+    <p:sldId id="309" r:id="rId34"/>
+    <p:sldId id="312" r:id="rId35"/>
+    <p:sldId id="310" r:id="rId36"/>
+    <p:sldId id="311" r:id="rId37"/>
+    <p:sldId id="313" r:id="rId38"/>
+    <p:sldId id="258" r:id="rId39"/>
   </p:sldIdLst>
   <p:sldSz cx="9144000" cy="5143500" type="screen16x9"/>
   <p:notesSz cx="6858000" cy="9144000"/>
@@ -509,6 +510,814 @@
     </a:lvl9pPr>
   </p:notesStyle>
 </p:notesMaster>
+</file>
+
+<file path=ppt/notesSlides/notesSlide1.xml><?xml version="1.0" encoding="utf-8"?>
+<p:notes xmlns:a="http://schemas.openxmlformats.org/drawingml/2006/main" xmlns:r="http://schemas.openxmlformats.org/officeDocument/2006/relationships" xmlns:p="http://schemas.openxmlformats.org/presentationml/2006/main">
+  <p:cSld>
+    <p:spTree>
+      <p:nvGrpSpPr>
+        <p:cNvPr id="1" name=""/>
+        <p:cNvGrpSpPr/>
+        <p:nvPr/>
+      </p:nvGrpSpPr>
+      <p:grpSpPr>
+        <a:xfrm>
+          <a:off x="0" y="0"/>
+          <a:ext cx="0" cy="0"/>
+          <a:chOff x="0" y="0"/>
+          <a:chExt cx="0" cy="0"/>
+        </a:xfrm>
+      </p:grpSpPr>
+      <p:sp>
+        <p:nvSpPr>
+          <p:cNvPr id="2" name="Slide Image Placeholder 1"/>
+          <p:cNvSpPr>
+            <a:spLocks noGrp="1" noRot="1" noChangeAspect="1"/>
+          </p:cNvSpPr>
+          <p:nvPr>
+            <p:ph type="sldImg"/>
+          </p:nvPr>
+        </p:nvSpPr>
+        <p:spPr/>
+      </p:sp>
+      <p:sp>
+        <p:nvSpPr>
+          <p:cNvPr id="3" name="Notes Placeholder 2"/>
+          <p:cNvSpPr>
+            <a:spLocks noGrp="1"/>
+          </p:cNvSpPr>
+          <p:nvPr>
+            <p:ph type="body" idx="1"/>
+          </p:nvPr>
+        </p:nvSpPr>
+        <p:spPr/>
+        <p:txBody>
+          <a:bodyPr/>
+          <a:lstStyle/>
+          <a:p>
+            <a:endParaRPr lang="en-US" dirty="0"/>
+          </a:p>
+        </p:txBody>
+      </p:sp>
+      <p:sp>
+        <p:nvSpPr>
+          <p:cNvPr id="4" name="Slide Number Placeholder 3"/>
+          <p:cNvSpPr>
+            <a:spLocks noGrp="1"/>
+          </p:cNvSpPr>
+          <p:nvPr>
+            <p:ph type="sldNum" sz="quarter" idx="5"/>
+          </p:nvPr>
+        </p:nvSpPr>
+        <p:spPr/>
+        <p:txBody>
+          <a:bodyPr/>
+          <a:lstStyle/>
+          <a:p>
+            <a:fld id="{224B9F7B-6D2C-D847-BDB0-B95DB96DAEE8}" type="slidenum">
+              <a:rPr lang="en-US" smtClean="0"/>
+              <a:t>1</a:t>
+            </a:fld>
+            <a:endParaRPr lang="en-US"/>
+          </a:p>
+        </p:txBody>
+      </p:sp>
+    </p:spTree>
+    <p:extLst>
+      <p:ext uri="{BB962C8B-B14F-4D97-AF65-F5344CB8AC3E}">
+        <p14:creationId xmlns:p14="http://schemas.microsoft.com/office/powerpoint/2010/main" val="4255218388"/>
+      </p:ext>
+    </p:extLst>
+  </p:cSld>
+  <p:clrMapOvr>
+    <a:masterClrMapping/>
+  </p:clrMapOvr>
+</p:notes>
+</file>
+
+<file path=ppt/notesSlides/notesSlide2.xml><?xml version="1.0" encoding="utf-8"?>
+<p:notes xmlns:a="http://schemas.openxmlformats.org/drawingml/2006/main" xmlns:r="http://schemas.openxmlformats.org/officeDocument/2006/relationships" xmlns:p="http://schemas.openxmlformats.org/presentationml/2006/main">
+  <p:cSld>
+    <p:spTree>
+      <p:nvGrpSpPr>
+        <p:cNvPr id="1" name=""/>
+        <p:cNvGrpSpPr/>
+        <p:nvPr/>
+      </p:nvGrpSpPr>
+      <p:grpSpPr>
+        <a:xfrm>
+          <a:off x="0" y="0"/>
+          <a:ext cx="0" cy="0"/>
+          <a:chOff x="0" y="0"/>
+          <a:chExt cx="0" cy="0"/>
+        </a:xfrm>
+      </p:grpSpPr>
+      <p:sp>
+        <p:nvSpPr>
+          <p:cNvPr id="2" name="Slide Image Placeholder 1"/>
+          <p:cNvSpPr>
+            <a:spLocks noGrp="1" noRot="1" noChangeAspect="1"/>
+          </p:cNvSpPr>
+          <p:nvPr>
+            <p:ph type="sldImg"/>
+          </p:nvPr>
+        </p:nvSpPr>
+        <p:spPr/>
+      </p:sp>
+      <p:sp>
+        <p:nvSpPr>
+          <p:cNvPr id="3" name="Notes Placeholder 2"/>
+          <p:cNvSpPr>
+            <a:spLocks noGrp="1"/>
+          </p:cNvSpPr>
+          <p:nvPr>
+            <p:ph type="body" idx="1"/>
+          </p:nvPr>
+        </p:nvSpPr>
+        <p:spPr/>
+        <p:txBody>
+          <a:bodyPr/>
+          <a:lstStyle/>
+          <a:p>
+            <a:r>
+              <a:rPr lang="en-US" sz="1200" b="0" i="0" kern="1200" dirty="0">
+                <a:solidFill>
+                  <a:schemeClr val="tx1"/>
+                </a:solidFill>
+                <a:effectLst/>
+                <a:latin typeface="+mn-lt"/>
+                <a:ea typeface="+mn-ea"/>
+                <a:cs typeface="+mn-cs"/>
+              </a:rPr>
+              <a:t>In the context of electronic health records (EHRs), a "computable phenotype," or simply "phenotype," is a clinical condition or characteristic that can be ascertained by means of a computerized query to an EHR system or clinical data repository using a defined set of data elements and logical expressions. These queries can identify patients with particular conditions and can be used to support a variety of purposes, including population management, quality measurement, and observational and interventional research. Standardized computable phenotypes can facilitate large-scale pragmatic clinical trials (PCTs) across multiple healthcare systems while ensuring reliability and reproducibility (</a:t>
+            </a:r>
+            <a:r>
+              <a:rPr lang="en-US" sz="1200" b="0" i="0" u="sng" kern="1200" dirty="0">
+                <a:solidFill>
+                  <a:schemeClr val="tx1"/>
+                </a:solidFill>
+                <a:effectLst/>
+                <a:latin typeface="+mn-lt"/>
+                <a:ea typeface="+mn-ea"/>
+                <a:cs typeface="+mn-cs"/>
+                <a:hlinkClick r:id="rId3"/>
+              </a:rPr>
+              <a:t>Richesson et al 2013</a:t>
+            </a:r>
+            <a:r>
+              <a:rPr lang="en-US" sz="1200" b="0" i="0" kern="1200" dirty="0">
+                <a:solidFill>
+                  <a:schemeClr val="tx1"/>
+                </a:solidFill>
+                <a:effectLst/>
+                <a:latin typeface="+mn-lt"/>
+                <a:ea typeface="+mn-ea"/>
+                <a:cs typeface="+mn-cs"/>
+              </a:rPr>
+              <a:t>).</a:t>
+            </a:r>
+            <a:endParaRPr lang="en-US" dirty="0"/>
+          </a:p>
+        </p:txBody>
+      </p:sp>
+      <p:sp>
+        <p:nvSpPr>
+          <p:cNvPr id="4" name="Slide Number Placeholder 3"/>
+          <p:cNvSpPr>
+            <a:spLocks noGrp="1"/>
+          </p:cNvSpPr>
+          <p:nvPr>
+            <p:ph type="sldNum" sz="quarter" idx="5"/>
+          </p:nvPr>
+        </p:nvSpPr>
+        <p:spPr/>
+        <p:txBody>
+          <a:bodyPr/>
+          <a:lstStyle/>
+          <a:p>
+            <a:fld id="{224B9F7B-6D2C-D847-BDB0-B95DB96DAEE8}" type="slidenum">
+              <a:rPr lang="en-US" smtClean="0"/>
+              <a:t>8</a:t>
+            </a:fld>
+            <a:endParaRPr lang="en-US"/>
+          </a:p>
+        </p:txBody>
+      </p:sp>
+    </p:spTree>
+    <p:extLst>
+      <p:ext uri="{BB962C8B-B14F-4D97-AF65-F5344CB8AC3E}">
+        <p14:creationId xmlns:p14="http://schemas.microsoft.com/office/powerpoint/2010/main" val="4021825312"/>
+      </p:ext>
+    </p:extLst>
+  </p:cSld>
+  <p:clrMapOvr>
+    <a:masterClrMapping/>
+  </p:clrMapOvr>
+</p:notes>
+</file>
+
+<file path=ppt/notesSlides/notesSlide3.xml><?xml version="1.0" encoding="utf-8"?>
+<p:notes xmlns:a="http://schemas.openxmlformats.org/drawingml/2006/main" xmlns:r="http://schemas.openxmlformats.org/officeDocument/2006/relationships" xmlns:p="http://schemas.openxmlformats.org/presentationml/2006/main">
+  <p:cSld>
+    <p:spTree>
+      <p:nvGrpSpPr>
+        <p:cNvPr id="1" name=""/>
+        <p:cNvGrpSpPr/>
+        <p:nvPr/>
+      </p:nvGrpSpPr>
+      <p:grpSpPr>
+        <a:xfrm>
+          <a:off x="0" y="0"/>
+          <a:ext cx="0" cy="0"/>
+          <a:chOff x="0" y="0"/>
+          <a:chExt cx="0" cy="0"/>
+        </a:xfrm>
+      </p:grpSpPr>
+      <p:sp>
+        <p:nvSpPr>
+          <p:cNvPr id="2" name="Slide Image Placeholder 1"/>
+          <p:cNvSpPr>
+            <a:spLocks noGrp="1" noRot="1" noChangeAspect="1"/>
+          </p:cNvSpPr>
+          <p:nvPr>
+            <p:ph type="sldImg"/>
+          </p:nvPr>
+        </p:nvSpPr>
+        <p:spPr/>
+      </p:sp>
+      <p:sp>
+        <p:nvSpPr>
+          <p:cNvPr id="3" name="Notes Placeholder 2"/>
+          <p:cNvSpPr>
+            <a:spLocks noGrp="1"/>
+          </p:cNvSpPr>
+          <p:nvPr>
+            <p:ph type="body" idx="1"/>
+          </p:nvPr>
+        </p:nvSpPr>
+        <p:spPr/>
+        <p:txBody>
+          <a:bodyPr/>
+          <a:lstStyle/>
+          <a:p>
+            <a:r>
+              <a:rPr lang="en-US" dirty="0"/>
+              <a:t>A term (with a code) defined in a medical terminology (e.g., SNOMED CT). Here we see how a concept for atrial fibrillation is stored in OMOP. </a:t>
+            </a:r>
+          </a:p>
+        </p:txBody>
+      </p:sp>
+      <p:sp>
+        <p:nvSpPr>
+          <p:cNvPr id="4" name="Slide Number Placeholder 3"/>
+          <p:cNvSpPr>
+            <a:spLocks noGrp="1"/>
+          </p:cNvSpPr>
+          <p:nvPr>
+            <p:ph type="sldNum" sz="quarter" idx="5"/>
+          </p:nvPr>
+        </p:nvSpPr>
+        <p:spPr/>
+        <p:txBody>
+          <a:bodyPr/>
+          <a:lstStyle/>
+          <a:p>
+            <a:fld id="{224B9F7B-6D2C-D847-BDB0-B95DB96DAEE8}" type="slidenum">
+              <a:rPr lang="en-US" smtClean="0"/>
+              <a:t>9</a:t>
+            </a:fld>
+            <a:endParaRPr lang="en-US"/>
+          </a:p>
+        </p:txBody>
+      </p:sp>
+    </p:spTree>
+    <p:extLst>
+      <p:ext uri="{BB962C8B-B14F-4D97-AF65-F5344CB8AC3E}">
+        <p14:creationId xmlns:p14="http://schemas.microsoft.com/office/powerpoint/2010/main" val="1218104706"/>
+      </p:ext>
+    </p:extLst>
+  </p:cSld>
+  <p:clrMapOvr>
+    <a:masterClrMapping/>
+  </p:clrMapOvr>
+</p:notes>
+</file>
+
+<file path=ppt/notesSlides/notesSlide4.xml><?xml version="1.0" encoding="utf-8"?>
+<p:notes xmlns:a="http://schemas.openxmlformats.org/drawingml/2006/main" xmlns:r="http://schemas.openxmlformats.org/officeDocument/2006/relationships" xmlns:p="http://schemas.openxmlformats.org/presentationml/2006/main">
+  <p:cSld>
+    <p:spTree>
+      <p:nvGrpSpPr>
+        <p:cNvPr id="1" name=""/>
+        <p:cNvGrpSpPr/>
+        <p:nvPr/>
+      </p:nvGrpSpPr>
+      <p:grpSpPr>
+        <a:xfrm>
+          <a:off x="0" y="0"/>
+          <a:ext cx="0" cy="0"/>
+          <a:chOff x="0" y="0"/>
+          <a:chExt cx="0" cy="0"/>
+        </a:xfrm>
+      </p:grpSpPr>
+      <p:sp>
+        <p:nvSpPr>
+          <p:cNvPr id="2" name="Slide Image Placeholder 1"/>
+          <p:cNvSpPr>
+            <a:spLocks noGrp="1" noRot="1" noChangeAspect="1"/>
+          </p:cNvSpPr>
+          <p:nvPr>
+            <p:ph type="sldImg"/>
+          </p:nvPr>
+        </p:nvSpPr>
+        <p:spPr/>
+      </p:sp>
+      <p:sp>
+        <p:nvSpPr>
+          <p:cNvPr id="3" name="Notes Placeholder 2"/>
+          <p:cNvSpPr>
+            <a:spLocks noGrp="1"/>
+          </p:cNvSpPr>
+          <p:nvPr>
+            <p:ph type="body" idx="1"/>
+          </p:nvPr>
+        </p:nvSpPr>
+        <p:spPr/>
+        <p:txBody>
+          <a:bodyPr/>
+          <a:lstStyle/>
+          <a:p>
+            <a:r>
+              <a:rPr lang="en-US" sz="1200" b="0" i="0" kern="1200" dirty="0">
+                <a:solidFill>
+                  <a:schemeClr val="tx1"/>
+                </a:solidFill>
+                <a:effectLst/>
+                <a:latin typeface="+mn-lt"/>
+                <a:ea typeface="+mn-ea"/>
+                <a:cs typeface="+mn-cs"/>
+              </a:rPr>
+              <a:t>A concept set is an expression representing a list of concepts that can be used as a reusable component in various analyses. It can be thought of as a standardized, computer-executable equivalent of the code lists often used in observational studies. A concept set expression consists of a list of concepts with the following attributes:</a:t>
+            </a:r>
+          </a:p>
+          <a:p>
+            <a:r>
+              <a:rPr lang="en-US" sz="1200" b="1" i="0" kern="1200" dirty="0">
+                <a:solidFill>
+                  <a:schemeClr val="tx1"/>
+                </a:solidFill>
+                <a:effectLst/>
+                <a:latin typeface="+mn-lt"/>
+                <a:ea typeface="+mn-ea"/>
+                <a:cs typeface="+mn-cs"/>
+              </a:rPr>
+              <a:t>Exclude</a:t>
+            </a:r>
+            <a:r>
+              <a:rPr lang="en-US" sz="1200" b="0" i="0" kern="1200" dirty="0">
+                <a:solidFill>
+                  <a:schemeClr val="tx1"/>
+                </a:solidFill>
+                <a:effectLst/>
+                <a:latin typeface="+mn-lt"/>
+                <a:ea typeface="+mn-ea"/>
+                <a:cs typeface="+mn-cs"/>
+              </a:rPr>
+              <a:t>: Exclude this concept (and any of its descendants if selected) from the concept set.</a:t>
+            </a:r>
+          </a:p>
+          <a:p>
+            <a:r>
+              <a:rPr lang="en-US" sz="1200" b="1" i="0" kern="1200" dirty="0">
+                <a:solidFill>
+                  <a:schemeClr val="tx1"/>
+                </a:solidFill>
+                <a:effectLst/>
+                <a:latin typeface="+mn-lt"/>
+                <a:ea typeface="+mn-ea"/>
+                <a:cs typeface="+mn-cs"/>
+              </a:rPr>
+              <a:t>Descendants</a:t>
+            </a:r>
+            <a:r>
+              <a:rPr lang="en-US" sz="1200" b="0" i="0" kern="1200" dirty="0">
+                <a:solidFill>
+                  <a:schemeClr val="tx1"/>
+                </a:solidFill>
+                <a:effectLst/>
+                <a:latin typeface="+mn-lt"/>
+                <a:ea typeface="+mn-ea"/>
+                <a:cs typeface="+mn-cs"/>
+              </a:rPr>
+              <a:t>: Consider not only this concept, but also all of its descendants.</a:t>
+            </a:r>
+          </a:p>
+          <a:p>
+            <a:r>
+              <a:rPr lang="en-US" sz="1200" b="1" i="0" kern="1200" dirty="0">
+                <a:solidFill>
+                  <a:schemeClr val="tx1"/>
+                </a:solidFill>
+                <a:effectLst/>
+                <a:latin typeface="+mn-lt"/>
+                <a:ea typeface="+mn-ea"/>
+                <a:cs typeface="+mn-cs"/>
+              </a:rPr>
+              <a:t>Mapped</a:t>
+            </a:r>
+            <a:r>
+              <a:rPr lang="en-US" sz="1200" b="0" i="0" kern="1200" dirty="0">
+                <a:solidFill>
+                  <a:schemeClr val="tx1"/>
+                </a:solidFill>
+                <a:effectLst/>
+                <a:latin typeface="+mn-lt"/>
+                <a:ea typeface="+mn-ea"/>
+                <a:cs typeface="+mn-cs"/>
+              </a:rPr>
+              <a:t>: Allow to search for non-standard concepts.</a:t>
+            </a:r>
+          </a:p>
+          <a:p>
+            <a:br>
+              <a:rPr lang="en-US" dirty="0"/>
+            </a:br>
+            <a:r>
+              <a:rPr lang="en-US" sz="1200" b="0" i="0" kern="1200" dirty="0">
+                <a:solidFill>
+                  <a:schemeClr val="tx1"/>
+                </a:solidFill>
+                <a:effectLst/>
+                <a:latin typeface="+mn-lt"/>
+                <a:ea typeface="+mn-ea"/>
+                <a:cs typeface="+mn-cs"/>
+              </a:rPr>
+              <a:t> For the most part, they are comprised of items like conditions, drugs, procedures, measurements, observations, and visits</a:t>
+            </a:r>
+            <a:endParaRPr lang="en-US" dirty="0"/>
+          </a:p>
+        </p:txBody>
+      </p:sp>
+      <p:sp>
+        <p:nvSpPr>
+          <p:cNvPr id="4" name="Slide Number Placeholder 3"/>
+          <p:cNvSpPr>
+            <a:spLocks noGrp="1"/>
+          </p:cNvSpPr>
+          <p:nvPr>
+            <p:ph type="sldNum" sz="quarter" idx="5"/>
+          </p:nvPr>
+        </p:nvSpPr>
+        <p:spPr/>
+        <p:txBody>
+          <a:bodyPr/>
+          <a:lstStyle/>
+          <a:p>
+            <a:fld id="{224B9F7B-6D2C-D847-BDB0-B95DB96DAEE8}" type="slidenum">
+              <a:rPr lang="en-US" smtClean="0"/>
+              <a:t>10</a:t>
+            </a:fld>
+            <a:endParaRPr lang="en-US"/>
+          </a:p>
+        </p:txBody>
+      </p:sp>
+    </p:spTree>
+    <p:extLst>
+      <p:ext uri="{BB962C8B-B14F-4D97-AF65-F5344CB8AC3E}">
+        <p14:creationId xmlns:p14="http://schemas.microsoft.com/office/powerpoint/2010/main" val="1880779099"/>
+      </p:ext>
+    </p:extLst>
+  </p:cSld>
+  <p:clrMapOvr>
+    <a:masterClrMapping/>
+  </p:clrMapOvr>
+</p:notes>
+</file>
+
+<file path=ppt/notesSlides/notesSlide5.xml><?xml version="1.0" encoding="utf-8"?>
+<p:notes xmlns:a="http://schemas.openxmlformats.org/drawingml/2006/main" xmlns:r="http://schemas.openxmlformats.org/officeDocument/2006/relationships" xmlns:p="http://schemas.openxmlformats.org/presentationml/2006/main">
+  <p:cSld>
+    <p:spTree>
+      <p:nvGrpSpPr>
+        <p:cNvPr id="1" name=""/>
+        <p:cNvGrpSpPr/>
+        <p:nvPr/>
+      </p:nvGrpSpPr>
+      <p:grpSpPr>
+        <a:xfrm>
+          <a:off x="0" y="0"/>
+          <a:ext cx="0" cy="0"/>
+          <a:chOff x="0" y="0"/>
+          <a:chExt cx="0" cy="0"/>
+        </a:xfrm>
+      </p:grpSpPr>
+      <p:sp>
+        <p:nvSpPr>
+          <p:cNvPr id="2" name="Slide Image Placeholder 1"/>
+          <p:cNvSpPr>
+            <a:spLocks noGrp="1" noRot="1" noChangeAspect="1"/>
+          </p:cNvSpPr>
+          <p:nvPr>
+            <p:ph type="sldImg"/>
+          </p:nvPr>
+        </p:nvSpPr>
+        <p:spPr/>
+      </p:sp>
+      <p:sp>
+        <p:nvSpPr>
+          <p:cNvPr id="3" name="Notes Placeholder 2"/>
+          <p:cNvSpPr>
+            <a:spLocks noGrp="1"/>
+          </p:cNvSpPr>
+          <p:nvPr>
+            <p:ph type="body" idx="1"/>
+          </p:nvPr>
+        </p:nvSpPr>
+        <p:spPr/>
+        <p:txBody>
+          <a:bodyPr/>
+          <a:lstStyle/>
+          <a:p>
+            <a:r>
+              <a:rPr lang="en-US" sz="1200" b="0" i="0" kern="1200" dirty="0">
+                <a:solidFill>
+                  <a:schemeClr val="tx1"/>
+                </a:solidFill>
+                <a:effectLst/>
+                <a:latin typeface="+mn-lt"/>
+                <a:ea typeface="+mn-ea"/>
+                <a:cs typeface="+mn-cs"/>
+              </a:rPr>
+              <a:t>For example, a concept set expression could contains two concepts as depicted in Table </a:t>
+            </a:r>
+            <a:r>
+              <a:rPr lang="en-US" sz="1200" b="0" i="0" u="none" strike="noStrike" kern="1200" dirty="0">
+                <a:solidFill>
+                  <a:schemeClr val="tx1"/>
+                </a:solidFill>
+                <a:effectLst/>
+                <a:latin typeface="+mn-lt"/>
+                <a:ea typeface="+mn-ea"/>
+                <a:cs typeface="+mn-cs"/>
+                <a:hlinkClick r:id="rId3"/>
+              </a:rPr>
+              <a:t>10.1</a:t>
+            </a:r>
+            <a:r>
+              <a:rPr lang="en-US" sz="1200" b="0" i="0" kern="1200" dirty="0">
+                <a:solidFill>
+                  <a:schemeClr val="tx1"/>
+                </a:solidFill>
+                <a:effectLst/>
+                <a:latin typeface="+mn-lt"/>
+                <a:ea typeface="+mn-ea"/>
+                <a:cs typeface="+mn-cs"/>
+              </a:rPr>
+              <a:t>. Here we include concept </a:t>
+            </a:r>
+            <a:r>
+              <a:rPr lang="en-US" sz="1200" b="0" i="0" u="none" strike="noStrike" kern="1200" dirty="0">
+                <a:solidFill>
+                  <a:schemeClr val="tx1"/>
+                </a:solidFill>
+                <a:effectLst/>
+                <a:latin typeface="+mn-lt"/>
+                <a:ea typeface="+mn-ea"/>
+                <a:cs typeface="+mn-cs"/>
+                <a:hlinkClick r:id="rId4"/>
+              </a:rPr>
+              <a:t>4329847</a:t>
+            </a:r>
+            <a:r>
+              <a:rPr lang="en-US" sz="1200" b="0" i="0" kern="1200" dirty="0">
+                <a:solidFill>
+                  <a:schemeClr val="tx1"/>
+                </a:solidFill>
+                <a:effectLst/>
+                <a:latin typeface="+mn-lt"/>
+                <a:ea typeface="+mn-ea"/>
+                <a:cs typeface="+mn-cs"/>
+              </a:rPr>
+              <a:t> (“Myocardial infarction”) and all of its descendants, but exclude concept </a:t>
+            </a:r>
+            <a:r>
+              <a:rPr lang="en-US" sz="1200" b="0" i="0" u="none" strike="noStrike" kern="1200" dirty="0">
+                <a:solidFill>
+                  <a:schemeClr val="tx1"/>
+                </a:solidFill>
+                <a:effectLst/>
+                <a:latin typeface="+mn-lt"/>
+                <a:ea typeface="+mn-ea"/>
+                <a:cs typeface="+mn-cs"/>
+                <a:hlinkClick r:id="rId5"/>
+              </a:rPr>
+              <a:t>314666</a:t>
+            </a:r>
+            <a:r>
+              <a:rPr lang="en-US" sz="1200" b="0" i="0" kern="1200" dirty="0">
+                <a:solidFill>
+                  <a:schemeClr val="tx1"/>
+                </a:solidFill>
+                <a:effectLst/>
+                <a:latin typeface="+mn-lt"/>
+                <a:ea typeface="+mn-ea"/>
+                <a:cs typeface="+mn-cs"/>
+              </a:rPr>
+              <a:t> (“Old myocardial infarction”) and all of its descendants.</a:t>
+            </a:r>
+          </a:p>
+          <a:p>
+            <a:endParaRPr lang="en-US" sz="1200" b="0" i="0" kern="1200" dirty="0">
+              <a:solidFill>
+                <a:schemeClr val="tx1"/>
+              </a:solidFill>
+              <a:effectLst/>
+              <a:latin typeface="+mn-lt"/>
+              <a:ea typeface="+mn-ea"/>
+              <a:cs typeface="+mn-cs"/>
+            </a:endParaRPr>
+          </a:p>
+          <a:p>
+            <a:r>
+              <a:rPr lang="en-US" sz="1200" b="0" i="0" kern="1200" dirty="0">
+                <a:solidFill>
+                  <a:schemeClr val="tx1"/>
+                </a:solidFill>
+                <a:effectLst/>
+                <a:latin typeface="+mn-lt"/>
+                <a:ea typeface="+mn-ea"/>
+                <a:cs typeface="+mn-cs"/>
+              </a:rPr>
+              <a:t>As shown in Figure </a:t>
+            </a:r>
+            <a:r>
+              <a:rPr lang="en-US" sz="1200" b="0" i="0" u="none" strike="noStrike" kern="1200" dirty="0">
+                <a:solidFill>
+                  <a:schemeClr val="tx1"/>
+                </a:solidFill>
+                <a:effectLst/>
+                <a:latin typeface="+mn-lt"/>
+                <a:ea typeface="+mn-ea"/>
+                <a:cs typeface="+mn-cs"/>
+                <a:hlinkClick r:id="rId6"/>
+              </a:rPr>
+              <a:t>10.2</a:t>
+            </a:r>
+            <a:r>
+              <a:rPr lang="en-US" sz="1200" b="0" i="0" kern="1200" dirty="0">
+                <a:solidFill>
+                  <a:schemeClr val="tx1"/>
+                </a:solidFill>
+                <a:effectLst/>
+                <a:latin typeface="+mn-lt"/>
+                <a:ea typeface="+mn-ea"/>
+                <a:cs typeface="+mn-cs"/>
+              </a:rPr>
+              <a:t>, this will include “Myocardial infarction” and all of its descendants except “Old myocardial infarction” and its descendants. In total, this concept set expression implies nearly a hundred Standard Concepts. These Standard Concepts in turn reflect hundreds of source codes (e.g. ICD-9 and ICD-10 codes) that may appear in the various databases.</a:t>
+            </a:r>
+          </a:p>
+          <a:p>
+            <a:br>
+              <a:rPr lang="en-US" dirty="0"/>
+            </a:br>
+            <a:endParaRPr lang="en-US" dirty="0"/>
+          </a:p>
+        </p:txBody>
+      </p:sp>
+      <p:sp>
+        <p:nvSpPr>
+          <p:cNvPr id="4" name="Slide Number Placeholder 3"/>
+          <p:cNvSpPr>
+            <a:spLocks noGrp="1"/>
+          </p:cNvSpPr>
+          <p:nvPr>
+            <p:ph type="sldNum" sz="quarter" idx="5"/>
+          </p:nvPr>
+        </p:nvSpPr>
+        <p:spPr/>
+        <p:txBody>
+          <a:bodyPr/>
+          <a:lstStyle/>
+          <a:p>
+            <a:fld id="{224B9F7B-6D2C-D847-BDB0-B95DB96DAEE8}" type="slidenum">
+              <a:rPr lang="en-US" smtClean="0"/>
+              <a:t>11</a:t>
+            </a:fld>
+            <a:endParaRPr lang="en-US"/>
+          </a:p>
+        </p:txBody>
+      </p:sp>
+    </p:spTree>
+    <p:extLst>
+      <p:ext uri="{BB962C8B-B14F-4D97-AF65-F5344CB8AC3E}">
+        <p14:creationId xmlns:p14="http://schemas.microsoft.com/office/powerpoint/2010/main" val="3968642288"/>
+      </p:ext>
+    </p:extLst>
+  </p:cSld>
+  <p:clrMapOvr>
+    <a:masterClrMapping/>
+  </p:clrMapOvr>
+</p:notes>
+</file>
+
+<file path=ppt/notesSlides/notesSlide6.xml><?xml version="1.0" encoding="utf-8"?>
+<p:notes xmlns:a="http://schemas.openxmlformats.org/drawingml/2006/main" xmlns:r="http://schemas.openxmlformats.org/officeDocument/2006/relationships" xmlns:p="http://schemas.openxmlformats.org/presentationml/2006/main">
+  <p:cSld>
+    <p:spTree>
+      <p:nvGrpSpPr>
+        <p:cNvPr id="1" name=""/>
+        <p:cNvGrpSpPr/>
+        <p:nvPr/>
+      </p:nvGrpSpPr>
+      <p:grpSpPr>
+        <a:xfrm>
+          <a:off x="0" y="0"/>
+          <a:ext cx="0" cy="0"/>
+          <a:chOff x="0" y="0"/>
+          <a:chExt cx="0" cy="0"/>
+        </a:xfrm>
+      </p:grpSpPr>
+      <p:sp>
+        <p:nvSpPr>
+          <p:cNvPr id="2" name="Slide Image Placeholder 1"/>
+          <p:cNvSpPr>
+            <a:spLocks noGrp="1" noRot="1" noChangeAspect="1"/>
+          </p:cNvSpPr>
+          <p:nvPr>
+            <p:ph type="sldImg"/>
+          </p:nvPr>
+        </p:nvSpPr>
+        <p:spPr/>
+      </p:sp>
+      <p:sp>
+        <p:nvSpPr>
+          <p:cNvPr id="3" name="Notes Placeholder 2"/>
+          <p:cNvSpPr>
+            <a:spLocks noGrp="1"/>
+          </p:cNvSpPr>
+          <p:nvPr>
+            <p:ph type="body" idx="1"/>
+          </p:nvPr>
+        </p:nvSpPr>
+        <p:spPr/>
+        <p:txBody>
+          <a:bodyPr/>
+          <a:lstStyle/>
+          <a:p>
+            <a:r>
+              <a:rPr lang="en-US" dirty="0"/>
+              <a:t>A Domain defines the set of allowable Concepts for the standardized fields in the CDM tables. For example, the “Condition” Domain contains Concepts that describe a condition of a patient, and these Concepts can only be stored in the </a:t>
+            </a:r>
+            <a:r>
+              <a:rPr lang="en-US" dirty="0" err="1"/>
+              <a:t>condition_concept_id</a:t>
+            </a:r>
+            <a:r>
+              <a:rPr lang="en-US" dirty="0"/>
+              <a:t> field of the CONDITION_OCCURRENCE and CONDITION_ERA tables.</a:t>
+            </a:r>
+            <a:br>
+              <a:rPr lang="en-US" dirty="0"/>
+            </a:br>
+            <a:endParaRPr lang="en-US" dirty="0"/>
+          </a:p>
+        </p:txBody>
+      </p:sp>
+      <p:sp>
+        <p:nvSpPr>
+          <p:cNvPr id="4" name="Slide Number Placeholder 3"/>
+          <p:cNvSpPr>
+            <a:spLocks noGrp="1"/>
+          </p:cNvSpPr>
+          <p:nvPr>
+            <p:ph type="sldNum" sz="quarter" idx="5"/>
+          </p:nvPr>
+        </p:nvSpPr>
+        <p:spPr/>
+        <p:txBody>
+          <a:bodyPr/>
+          <a:lstStyle/>
+          <a:p>
+            <a:fld id="{224B9F7B-6D2C-D847-BDB0-B95DB96DAEE8}" type="slidenum">
+              <a:rPr lang="en-US" smtClean="0"/>
+              <a:t>13</a:t>
+            </a:fld>
+            <a:endParaRPr lang="en-US"/>
+          </a:p>
+        </p:txBody>
+      </p:sp>
+    </p:spTree>
+    <p:extLst>
+      <p:ext uri="{BB962C8B-B14F-4D97-AF65-F5344CB8AC3E}">
+        <p14:creationId xmlns:p14="http://schemas.microsoft.com/office/powerpoint/2010/main" val="3212494421"/>
+      </p:ext>
+    </p:extLst>
+  </p:cSld>
+  <p:clrMapOvr>
+    <a:masterClrMapping/>
+  </p:clrMapOvr>
+</p:notes>
 </file>
 
 <file path=ppt/slideLayouts/slideLayout1.xml><?xml version="1.0" encoding="utf-8"?>
@@ -2380,7 +3189,7 @@
       </p:sp>
       <p:pic>
         <p:nvPicPr>
-          <p:cNvPr id="4098" name="Picture 2" descr="Building Blocks of Cohort definitions.">
+          <p:cNvPr id="4098" name="Picture 2">
             <a:extLst>
               <a:ext uri="{FF2B5EF4-FFF2-40B4-BE49-F238E27FC236}">
                 <a16:creationId xmlns:a16="http://schemas.microsoft.com/office/drawing/2014/main" id="{8029EE38-D8D4-7946-97A9-759F6D1C5EE2}"/>
@@ -2393,22 +3202,14 @@
           <p:nvPr/>
         </p:nvPicPr>
         <p:blipFill>
-          <a:blip r:embed="rId2">
-            <a:extLst>
-              <a:ext uri="{28A0092B-C50C-407E-A947-70E740481C1C}">
-                <a14:useLocalDpi xmlns:a14="http://schemas.microsoft.com/office/drawing/2010/main" val="0"/>
-              </a:ext>
-            </a:extLst>
-          </a:blip>
+          <a:blip r:embed="rId3"/>
           <a:srcRect/>
-          <a:stretch>
-            <a:fillRect/>
-          </a:stretch>
+          <a:stretch/>
         </p:blipFill>
         <p:spPr bwMode="auto">
           <a:xfrm>
-            <a:off x="4326813" y="138499"/>
-            <a:ext cx="4239903" cy="4962892"/>
+            <a:off x="4326813" y="144694"/>
+            <a:ext cx="4239903" cy="4950501"/>
           </a:xfrm>
           <a:prstGeom prst="rect">
             <a:avLst/>
@@ -2531,7 +3332,7 @@
           <p:nvPr/>
         </p:nvPicPr>
         <p:blipFill>
-          <a:blip r:embed="rId2">
+          <a:blip r:embed="rId3">
             <a:extLst>
               <a:ext uri="{28A0092B-C50C-407E-A947-70E740481C1C}">
                 <a14:useLocalDpi xmlns:a14="http://schemas.microsoft.com/office/drawing/2010/main" val="0"/>
@@ -2602,6 +3403,36 @@
           </a:p>
         </p:txBody>
       </p:sp>
+      <p:pic>
+        <p:nvPicPr>
+          <p:cNvPr id="3" name="Picture 2">
+            <a:extLst>
+              <a:ext uri="{FF2B5EF4-FFF2-40B4-BE49-F238E27FC236}">
+                <a16:creationId xmlns:a16="http://schemas.microsoft.com/office/drawing/2014/main" id="{B6CBD496-D620-A7B0-89C4-00BBFAB4AD46}"/>
+              </a:ext>
+            </a:extLst>
+          </p:cNvPr>
+          <p:cNvPicPr>
+            <a:picLocks noChangeAspect="1"/>
+          </p:cNvPicPr>
+          <p:nvPr/>
+        </p:nvPicPr>
+        <p:blipFill>
+          <a:blip r:embed="rId4"/>
+          <a:stretch>
+            <a:fillRect/>
+          </a:stretch>
+        </p:blipFill>
+        <p:spPr>
+          <a:xfrm>
+            <a:off x="205740" y="1102959"/>
+            <a:ext cx="3970020" cy="885543"/>
+          </a:xfrm>
+          <a:prstGeom prst="rect">
+            <a:avLst/>
+          </a:prstGeom>
+        </p:spPr>
+      </p:pic>
     </p:spTree>
     <p:extLst>
       <p:ext uri="{BB962C8B-B14F-4D97-AF65-F5344CB8AC3E}">
@@ -6053,12 +6884,6 @@
             <a:endParaRPr lang="en-US" dirty="0"/>
           </a:p>
           <a:p>
-            <a:pPr marL="457200" indent="-457200">
-              <a:buAutoNum type="arabicPeriod"/>
-            </a:pPr>
-            <a:endParaRPr lang="en-US" dirty="0"/>
-          </a:p>
-          <a:p>
             <a:endParaRPr lang="en-US" dirty="0"/>
           </a:p>
         </p:txBody>
@@ -6154,12 +6979,6 @@
           </a:bodyPr>
           <a:lstStyle/>
           <a:p>
-            <a:r>
-              <a:rPr lang="en-US" dirty="0"/>
-              <a:t>Multiple-Table Query</a:t>
-            </a:r>
-          </a:p>
-          <a:p>
             <a:pPr marL="457200" indent="-457200">
               <a:buFont typeface="+mj-lt"/>
               <a:buAutoNum type="arabicPeriod" startAt="4"/>
@@ -6200,12 +7019,6 @@
               <a:rPr lang="en-US" dirty="0"/>
               <a:t> prior to ‘2020-01-01’). Save the results to a dataset by toggling “Save as dataset” and run the transform. </a:t>
             </a:r>
-          </a:p>
-          <a:p>
-            <a:pPr marL="457200" indent="-457200">
-              <a:buAutoNum type="arabicPeriod" startAt="4"/>
-            </a:pPr>
-            <a:endParaRPr lang="en-US" dirty="0"/>
           </a:p>
           <a:p>
             <a:endParaRPr lang="en-US" dirty="0"/>
@@ -6280,7 +7093,7 @@
           <p:cNvPr id="2" name="Text Placeholder 1">
             <a:extLst>
               <a:ext uri="{FF2B5EF4-FFF2-40B4-BE49-F238E27FC236}">
-                <a16:creationId xmlns:a16="http://schemas.microsoft.com/office/drawing/2014/main" id="{68C19471-BA4E-215A-352B-BF9FCF81AE05}"/>
+                <a16:creationId xmlns:a16="http://schemas.microsoft.com/office/drawing/2014/main" id="{B2917D46-87BE-934C-F9CC-D8B554011601}"/>
               </a:ext>
             </a:extLst>
           </p:cNvPr>
@@ -6293,18 +7106,23 @@
         </p:nvSpPr>
         <p:spPr>
           <a:xfrm>
-            <a:off x="342028" y="1214278"/>
-            <a:ext cx="8313457" cy="3706065"/>
+            <a:off x="342028" y="870560"/>
+            <a:ext cx="7887570" cy="4272940"/>
           </a:xfrm>
         </p:spPr>
         <p:txBody>
-          <a:bodyPr/>
+          <a:bodyPr>
+            <a:normAutofit/>
+          </a:bodyPr>
           <a:lstStyle/>
           <a:p>
             <a:r>
               <a:rPr lang="en-US" dirty="0"/>
-              <a:t>Follow the steps above, but this time for the micronutrient deficiency SNOMED CT code you identified in exercise 2. SNOMED CT: 70241007. Save the results in a new workbook and name it ”Micronutrient Deficiency.”</a:t>
-            </a:r>
+              <a:t>We will do the same thing, but using the concept set browser. </a:t>
+            </a:r>
+          </a:p>
+          <a:p>
+            <a:endParaRPr lang="en-US" dirty="0"/>
           </a:p>
         </p:txBody>
       </p:sp>
@@ -6313,7 +7131,7 @@
           <p:cNvPr id="4" name="Title 3">
             <a:extLst>
               <a:ext uri="{FF2B5EF4-FFF2-40B4-BE49-F238E27FC236}">
-                <a16:creationId xmlns:a16="http://schemas.microsoft.com/office/drawing/2014/main" id="{E588B617-0A50-FF9D-D4DD-BFEB74ADC3C7}"/>
+                <a16:creationId xmlns:a16="http://schemas.microsoft.com/office/drawing/2014/main" id="{82CBEE67-E62D-D227-F4B0-D3E4EB83DE47}"/>
               </a:ext>
             </a:extLst>
           </p:cNvPr>
@@ -6324,14 +7142,19 @@
             <p:ph type="title"/>
           </p:nvPr>
         </p:nvSpPr>
-        <p:spPr/>
+        <p:spPr>
+          <a:xfrm>
+            <a:off x="342028" y="92927"/>
+            <a:ext cx="7887570" cy="646110"/>
+          </a:xfrm>
+        </p:spPr>
         <p:txBody>
           <a:bodyPr/>
           <a:lstStyle/>
           <a:p>
             <a:r>
               <a:rPr lang="en-US" dirty="0"/>
-              <a:t>HOMEWORK 1</a:t>
+              <a:t>Bonus Exercise (follow along)</a:t>
             </a:r>
           </a:p>
         </p:txBody>
@@ -6339,7 +7162,7 @@
     </p:spTree>
     <p:extLst>
       <p:ext uri="{BB962C8B-B14F-4D97-AF65-F5344CB8AC3E}">
-        <p14:creationId xmlns:p14="http://schemas.microsoft.com/office/powerpoint/2010/main" val="1365750112"/>
+        <p14:creationId xmlns:p14="http://schemas.microsoft.com/office/powerpoint/2010/main" val="2138012264"/>
       </p:ext>
     </p:extLst>
   </p:cSld>
@@ -6394,17 +7217,7 @@
           <a:p>
             <a:r>
               <a:rPr lang="en-US" dirty="0"/>
-              <a:t>Go through the entire process (exercise 1 through 6) with the parent code for rheumatoid arthritis (69896004): </a:t>
-            </a:r>
-            <a:r>
-              <a:rPr lang="en-US" dirty="0">
-                <a:hlinkClick r:id="rId2"/>
-              </a:rPr>
-              <a:t>https://snomedbrowser.com/Codes/Details/69896004</a:t>
-            </a:r>
-            <a:r>
-              <a:rPr lang="en-US" dirty="0"/>
-              <a:t>. Save the results in a new workbook and name it “Rheumatoid Arthritis.” </a:t>
+              <a:t>Follow the steps above, but this time for the micronutrient deficiency SNOMED CT code you identified in exercise 2. SNOMED CT: 70241007. Save the results in a new workbook and name it ”Micronutrient Deficiency.”</a:t>
             </a:r>
           </a:p>
         </p:txBody>
@@ -6432,7 +7245,7 @@
           <a:p>
             <a:r>
               <a:rPr lang="en-US" dirty="0"/>
-              <a:t>HOMEWORK 2</a:t>
+              <a:t>HOMEWORK 1</a:t>
             </a:r>
           </a:p>
         </p:txBody>
@@ -6440,7 +7253,7 @@
     </p:spTree>
     <p:extLst>
       <p:ext uri="{BB962C8B-B14F-4D97-AF65-F5344CB8AC3E}">
-        <p14:creationId xmlns:p14="http://schemas.microsoft.com/office/powerpoint/2010/main" val="3677381740"/>
+        <p14:creationId xmlns:p14="http://schemas.microsoft.com/office/powerpoint/2010/main" val="1365750112"/>
       </p:ext>
     </p:extLst>
   </p:cSld>
@@ -6521,10 +7334,10 @@
       </p:grpSpPr>
       <p:sp>
         <p:nvSpPr>
-          <p:cNvPr id="2" name="Title 1">
+          <p:cNvPr id="2" name="Text Placeholder 1">
             <a:extLst>
               <a:ext uri="{FF2B5EF4-FFF2-40B4-BE49-F238E27FC236}">
-                <a16:creationId xmlns:a16="http://schemas.microsoft.com/office/drawing/2014/main" id="{4E3D7C41-2C51-D2FF-59CB-66AD79D17540}"/>
+                <a16:creationId xmlns:a16="http://schemas.microsoft.com/office/drawing/2014/main" id="{68C19471-BA4E-215A-352B-BF9FCF81AE05}"/>
               </a:ext>
             </a:extLst>
           </p:cNvPr>
@@ -6532,17 +7345,60 @@
             <a:spLocks noGrp="1"/>
           </p:cNvSpPr>
           <p:nvPr>
-            <p:ph type="title"/>
-          </p:nvPr>
-        </p:nvSpPr>
-        <p:spPr/>
+            <p:ph type="body" idx="1"/>
+          </p:nvPr>
+        </p:nvSpPr>
+        <p:spPr>
+          <a:xfrm>
+            <a:off x="342028" y="1214278"/>
+            <a:ext cx="8313457" cy="3706065"/>
+          </a:xfrm>
+        </p:spPr>
         <p:txBody>
           <a:bodyPr/>
           <a:lstStyle/>
           <a:p>
             <a:r>
               <a:rPr lang="en-US" dirty="0"/>
-              <a:t>Logic Liaison Template</a:t>
+              <a:t>Go through the entire process (exercise 1 through 6) with the parent code for rheumatoid arthritis (69896004): </a:t>
+            </a:r>
+            <a:r>
+              <a:rPr lang="en-US" dirty="0">
+                <a:hlinkClick r:id="rId2"/>
+              </a:rPr>
+              <a:t>https://snomedbrowser.com/Codes/Details/69896004</a:t>
+            </a:r>
+            <a:r>
+              <a:rPr lang="en-US" dirty="0"/>
+              <a:t>. Save the results in a new workbook and name it “Rheumatoid Arthritis.” </a:t>
+            </a:r>
+          </a:p>
+        </p:txBody>
+      </p:sp>
+      <p:sp>
+        <p:nvSpPr>
+          <p:cNvPr id="4" name="Title 3">
+            <a:extLst>
+              <a:ext uri="{FF2B5EF4-FFF2-40B4-BE49-F238E27FC236}">
+                <a16:creationId xmlns:a16="http://schemas.microsoft.com/office/drawing/2014/main" id="{E588B617-0A50-FF9D-D4DD-BFEB74ADC3C7}"/>
+              </a:ext>
+            </a:extLst>
+          </p:cNvPr>
+          <p:cNvSpPr>
+            <a:spLocks noGrp="1"/>
+          </p:cNvSpPr>
+          <p:nvPr>
+            <p:ph type="title"/>
+          </p:nvPr>
+        </p:nvSpPr>
+        <p:spPr/>
+        <p:txBody>
+          <a:bodyPr/>
+          <a:lstStyle/>
+          <a:p>
+            <a:r>
+              <a:rPr lang="en-US" dirty="0"/>
+              <a:t>HOMEWORK 2</a:t>
             </a:r>
           </a:p>
         </p:txBody>
@@ -6550,7 +7406,7 @@
     </p:spTree>
     <p:extLst>
       <p:ext uri="{BB962C8B-B14F-4D97-AF65-F5344CB8AC3E}">
-        <p14:creationId xmlns:p14="http://schemas.microsoft.com/office/powerpoint/2010/main" val="997942292"/>
+        <p14:creationId xmlns:p14="http://schemas.microsoft.com/office/powerpoint/2010/main" val="3677381740"/>
       </p:ext>
     </p:extLst>
   </p:cSld>
@@ -6579,10 +7435,10 @@
       </p:grpSpPr>
       <p:sp>
         <p:nvSpPr>
-          <p:cNvPr id="2" name="Text Placeholder 1">
+          <p:cNvPr id="2" name="Title 1">
             <a:extLst>
               <a:ext uri="{FF2B5EF4-FFF2-40B4-BE49-F238E27FC236}">
-                <a16:creationId xmlns:a16="http://schemas.microsoft.com/office/drawing/2014/main" id="{1EC8D89F-8105-8523-9B78-85252680F460}"/>
+                <a16:creationId xmlns:a16="http://schemas.microsoft.com/office/drawing/2014/main" id="{4E3D7C41-2C51-D2FF-59CB-66AD79D17540}"/>
               </a:ext>
             </a:extLst>
           </p:cNvPr>
@@ -6590,82 +7446,17 @@
             <a:spLocks noGrp="1"/>
           </p:cNvSpPr>
           <p:nvPr>
-            <p:ph type="body" idx="1"/>
-          </p:nvPr>
-        </p:nvSpPr>
-        <p:spPr>
-          <a:xfrm>
-            <a:off x="342028" y="1214278"/>
-            <a:ext cx="8369824" cy="3706065"/>
-          </a:xfrm>
-        </p:spPr>
+            <p:ph type="title"/>
+          </p:nvPr>
+        </p:nvSpPr>
+        <p:spPr/>
         <p:txBody>
           <a:bodyPr/>
           <a:lstStyle/>
           <a:p>
-            <a:pPr marL="342900" indent="-342900">
-              <a:buFont typeface="Arial" panose="020B0604020202020204" pitchFamily="34" charset="0"/>
-              <a:buChar char="•"/>
-            </a:pPr>
-            <a:r>
-              <a:rPr lang="en-US" dirty="0"/>
-              <a:t>We just defined one concept, meaning we only 29 to go for this very basic study!</a:t>
-            </a:r>
-          </a:p>
-          <a:p>
-            <a:pPr marL="342900" indent="-342900">
-              <a:buFont typeface="Arial" panose="020B0604020202020204" pitchFamily="34" charset="0"/>
-              <a:buChar char="•"/>
-            </a:pPr>
-            <a:r>
-              <a:rPr lang="en-US" dirty="0"/>
-              <a:t>The Logic Liaison Template seeks to streamline this process while enabling best practices in line with the literature (e.g., what constitutes a COVID hospitalization)</a:t>
-            </a:r>
-          </a:p>
-          <a:p>
-            <a:pPr marL="342900" indent="-342900">
-              <a:buFont typeface="Arial" panose="020B0604020202020204" pitchFamily="34" charset="0"/>
-              <a:buChar char="•"/>
-            </a:pPr>
-            <a:r>
-              <a:rPr lang="en-US" dirty="0"/>
-              <a:t>Documentation available here: https://</a:t>
-            </a:r>
-            <a:r>
-              <a:rPr lang="en-US" dirty="0" err="1"/>
-              <a:t>unite.nih.gov</a:t>
-            </a:r>
-            <a:r>
-              <a:rPr lang="en-US" dirty="0"/>
-              <a:t>/workspace/module/view/latest/ri.workshop.main.module.3ab34203-d7f3-482e-adbd-f4113bfd1a2b</a:t>
-            </a:r>
-          </a:p>
-        </p:txBody>
-      </p:sp>
-      <p:sp>
-        <p:nvSpPr>
-          <p:cNvPr id="4" name="Title 3">
-            <a:extLst>
-              <a:ext uri="{FF2B5EF4-FFF2-40B4-BE49-F238E27FC236}">
-                <a16:creationId xmlns:a16="http://schemas.microsoft.com/office/drawing/2014/main" id="{D04F5A47-2FCD-C100-9CE8-D18E7D23B5B8}"/>
-              </a:ext>
-            </a:extLst>
-          </p:cNvPr>
-          <p:cNvSpPr>
-            <a:spLocks noGrp="1"/>
-          </p:cNvSpPr>
-          <p:nvPr>
-            <p:ph type="title"/>
-          </p:nvPr>
-        </p:nvSpPr>
-        <p:spPr/>
-        <p:txBody>
-          <a:bodyPr/>
-          <a:lstStyle/>
-          <a:p>
-            <a:r>
-              <a:rPr lang="en-US" dirty="0"/>
-              <a:t>Rationale</a:t>
+            <a:r>
+              <a:rPr lang="en-US" dirty="0"/>
+              <a:t>Logic Liaison Template</a:t>
             </a:r>
           </a:p>
         </p:txBody>
@@ -6673,7 +7464,7 @@
     </p:spTree>
     <p:extLst>
       <p:ext uri="{BB962C8B-B14F-4D97-AF65-F5344CB8AC3E}">
-        <p14:creationId xmlns:p14="http://schemas.microsoft.com/office/powerpoint/2010/main" val="4065133781"/>
+        <p14:creationId xmlns:p14="http://schemas.microsoft.com/office/powerpoint/2010/main" val="997942292"/>
       </p:ext>
     </p:extLst>
   </p:cSld>
@@ -6718,14 +7509,12 @@
         </p:nvSpPr>
         <p:spPr>
           <a:xfrm>
-            <a:off x="342028" y="751562"/>
-            <a:ext cx="8369824" cy="4484317"/>
+            <a:off x="342028" y="1214278"/>
+            <a:ext cx="8369824" cy="3706065"/>
           </a:xfrm>
         </p:spPr>
         <p:txBody>
-          <a:bodyPr>
-            <a:normAutofit fontScale="70000" lnSpcReduction="20000"/>
-          </a:bodyPr>
+          <a:bodyPr/>
           <a:lstStyle/>
           <a:p>
             <a:pPr marL="342900" indent="-342900">
@@ -6734,25 +7523,8 @@
             </a:pPr>
             <a:r>
               <a:rPr lang="en-US" dirty="0"/>
-              <a:t>[LOGIC LIAISON TEMPLATE] L2 and L3 Fact Tables: COVID-19 Diagnosed or Lab Confirmed Patients</a:t>
-            </a:r>
-          </a:p>
-          <a:p>
-            <a:pPr marL="800089" lvl="1" indent="-342900">
-              <a:buFont typeface="Arial" panose="020B0604020202020204" pitchFamily="34" charset="0"/>
-              <a:buChar char="•"/>
-            </a:pPr>
-            <a:r>
-              <a:rPr lang="en-US" dirty="0"/>
-              <a:t>This LOGIC LIAISON template produces a table of commonly used variables for COVID-19 Positive Patients (diagnosed with U07.1 and/or rt-PCR/AG confirmed). Both level 2 and level 3 versions of the template are provided in this object, as well as the final tables they produce.</a:t>
-            </a:r>
-          </a:p>
-          <a:p>
-            <a:pPr marL="800089" lvl="1" indent="-342900">
-              <a:buFont typeface="Arial" panose="020B0604020202020204" pitchFamily="34" charset="0"/>
-              <a:buChar char="•"/>
-            </a:pPr>
-            <a:endParaRPr lang="en-US" dirty="0"/>
+              <a:t>We just defined one concept, meaning we only 29 to go for this very basic study!</a:t>
+            </a:r>
           </a:p>
           <a:p>
             <a:pPr marL="342900" indent="-342900">
@@ -6761,17 +7533,7 @@
             </a:pPr>
             <a:r>
               <a:rPr lang="en-US" dirty="0"/>
-              <a:t>[LOGIC LIAISON TEMPLATE] L2 and L3 Fact Tables: All Patients</a:t>
-            </a:r>
-          </a:p>
-          <a:p>
-            <a:pPr marL="800089" lvl="1" indent="-342900">
-              <a:buFont typeface="Arial" panose="020B0604020202020204" pitchFamily="34" charset="0"/>
-              <a:buChar char="•"/>
-            </a:pPr>
-            <a:r>
-              <a:rPr lang="en-US" dirty="0"/>
-              <a:t>This set of templates (Level 2 and Level 3 data versions) provides sample code and summary datasets including a visit-level and a patient-level table. The visit-level "all facts" table has a single row for each patient and each visit day (where any of the facts searched are found to be present). The patient-level table contains one row for each patient and a number of commonly referenced facts and indicators derived from the N3C datasets</a:t>
+              <a:t>The Logic Liaison Template seeks to streamline this process while enabling best practices in line with the literature (e.g., what constitutes a COVID hospitalization)</a:t>
             </a:r>
           </a:p>
           <a:p>
@@ -6781,69 +7543,15 @@
             </a:pPr>
             <a:r>
               <a:rPr lang="en-US" dirty="0"/>
-              <a:t>[Logic Liaison Template] Data Density by Site and Domain</a:t>
-            </a:r>
-          </a:p>
-          <a:p>
-            <a:pPr marL="800089" lvl="1" indent="-342900">
-              <a:buFont typeface="Arial" panose="020B0604020202020204" pitchFamily="34" charset="0"/>
-              <a:buChar char="•"/>
-            </a:pPr>
-            <a:r>
-              <a:rPr lang="en-US" dirty="0"/>
-              <a:t>This template calculates the Standardized Density, Median Absolute Deviation (MAD), and Directional Median Deviations (DMD) with respect to the number of unique patient/concept/days for each of the major OMOP tables (i.e. </a:t>
+              <a:t>Documentation available here: https://</a:t>
             </a:r>
             <a:r>
               <a:rPr lang="en-US" dirty="0" err="1"/>
-              <a:t>condition_occurrence</a:t>
-            </a:r>
-            <a:r>
-              <a:rPr lang="en-US" dirty="0"/>
-              <a:t>, </a:t>
-            </a:r>
-            <a:r>
-              <a:rPr lang="en-US" dirty="0" err="1"/>
-              <a:t>drug_exposure</a:t>
-            </a:r>
-            <a:r>
-              <a:rPr lang="en-US" dirty="0"/>
-              <a:t>, </a:t>
-            </a:r>
-            <a:r>
-              <a:rPr lang="en-US" dirty="0" err="1"/>
-              <a:t>etc</a:t>
-            </a:r>
-            <a:r>
-              <a:rPr lang="en-US" dirty="0"/>
-              <a:t>) and uses them to create a heatmap displaying how many MADs each site is from the median for each OMOP table. The template also scores the site's date shifting practices.</a:t>
-            </a:r>
-          </a:p>
-          <a:p>
-            <a:pPr marL="342900" indent="-342900">
-              <a:buFont typeface="Arial" panose="020B0604020202020204" pitchFamily="34" charset="0"/>
-              <a:buChar char="•"/>
-            </a:pPr>
-            <a:r>
-              <a:rPr lang="en-US" dirty="0"/>
-              <a:t>[Logic Liaison Template] Fact Density by Site Visualization</a:t>
-            </a:r>
-          </a:p>
-          <a:p>
-            <a:pPr marL="800089" lvl="1" indent="-342900">
-              <a:buFont typeface="Arial" panose="020B0604020202020204" pitchFamily="34" charset="0"/>
-              <a:buChar char="•"/>
-            </a:pPr>
-            <a:r>
-              <a:rPr lang="en-US" dirty="0"/>
-              <a:t>This template calculates the Standardized Density, Median Absolute Deviation (MAD), and Directional Median Deviations (DMD) with respect to the numerical values in each column of the input table (any non-numerical field is converted to a binary value using the </a:t>
-            </a:r>
-            <a:r>
-              <a:rPr lang="en-US" dirty="0" err="1"/>
-              <a:t>isNotNull</a:t>
-            </a:r>
-            <a:r>
-              <a:rPr lang="en-US" dirty="0"/>
-              <a:t>() function) and creates heatmaps to visualize the metrics.</a:t>
+              <a:t>unite.nih.gov</a:t>
+            </a:r>
+            <a:r>
+              <a:rPr lang="en-US" dirty="0"/>
+              <a:t>/workspace/module/view/latest/ri.workshop.main.module.3ab34203-d7f3-482e-adbd-f4113bfd1a2b</a:t>
             </a:r>
           </a:p>
         </p:txBody>
@@ -6864,19 +7572,14 @@
             <p:ph type="title"/>
           </p:nvPr>
         </p:nvSpPr>
-        <p:spPr>
-          <a:xfrm>
-            <a:off x="342028" y="67875"/>
-            <a:ext cx="7887570" cy="733792"/>
-          </a:xfrm>
-        </p:spPr>
+        <p:spPr/>
         <p:txBody>
           <a:bodyPr/>
           <a:lstStyle/>
           <a:p>
             <a:r>
               <a:rPr lang="en-US" dirty="0"/>
-              <a:t>LL Templates</a:t>
+              <a:t>Rationale</a:t>
             </a:r>
           </a:p>
         </p:txBody>
@@ -6884,7 +7587,7 @@
     </p:spTree>
     <p:extLst>
       <p:ext uri="{BB962C8B-B14F-4D97-AF65-F5344CB8AC3E}">
-        <p14:creationId xmlns:p14="http://schemas.microsoft.com/office/powerpoint/2010/main" val="3721500001"/>
+        <p14:creationId xmlns:p14="http://schemas.microsoft.com/office/powerpoint/2010/main" val="4065133781"/>
       </p:ext>
     </p:extLst>
   </p:cSld>
@@ -6916,7 +7619,7 @@
           <p:cNvPr id="2" name="Text Placeholder 1">
             <a:extLst>
               <a:ext uri="{FF2B5EF4-FFF2-40B4-BE49-F238E27FC236}">
-                <a16:creationId xmlns:a16="http://schemas.microsoft.com/office/drawing/2014/main" id="{94D9DFF7-7A27-61C8-6417-4AB9B6521500}"/>
+                <a16:creationId xmlns:a16="http://schemas.microsoft.com/office/drawing/2014/main" id="{1EC8D89F-8105-8523-9B78-85252680F460}"/>
               </a:ext>
             </a:extLst>
           </p:cNvPr>
@@ -6929,28 +7632,41 @@
         </p:nvSpPr>
         <p:spPr>
           <a:xfrm>
-            <a:off x="342028" y="1214278"/>
-            <a:ext cx="7994043" cy="3706065"/>
+            <a:off x="342028" y="751562"/>
+            <a:ext cx="8369824" cy="4484317"/>
           </a:xfrm>
         </p:spPr>
         <p:txBody>
-          <a:bodyPr/>
+          <a:bodyPr>
+            <a:normAutofit fontScale="70000" lnSpcReduction="20000"/>
+          </a:bodyPr>
           <a:lstStyle/>
           <a:p>
-            <a:r>
-              <a:rPr lang="en-US" dirty="0"/>
-              <a:t>Deploy the Logic Liaison Template in your student folder!</a:t>
-            </a:r>
-          </a:p>
-          <a:p>
             <a:pPr marL="342900" indent="-342900">
               <a:buFont typeface="Arial" panose="020B0604020202020204" pitchFamily="34" charset="0"/>
               <a:buChar char="•"/>
             </a:pPr>
             <a:r>
               <a:rPr lang="en-US" dirty="0"/>
-              <a:t>Create a new code workbook and name it Logic Liaison COVID Positive</a:t>
-            </a:r>
+              <a:t>[LOGIC LIAISON TEMPLATE] L2 and L3 Fact Tables: COVID-19 Diagnosed or Lab Confirmed Patients</a:t>
+            </a:r>
+          </a:p>
+          <a:p>
+            <a:pPr marL="800089" lvl="1" indent="-342900">
+              <a:buFont typeface="Arial" panose="020B0604020202020204" pitchFamily="34" charset="0"/>
+              <a:buChar char="•"/>
+            </a:pPr>
+            <a:r>
+              <a:rPr lang="en-US" dirty="0"/>
+              <a:t>This LOGIC LIAISON template produces a table of commonly used variables for COVID-19 Positive Patients (diagnosed with U07.1 and/or rt-PCR/AG confirmed). Both level 2 and level 3 versions of the template are provided in this object, as well as the final tables they produce.</a:t>
+            </a:r>
+          </a:p>
+          <a:p>
+            <a:pPr marL="800089" lvl="1" indent="-342900">
+              <a:buFont typeface="Arial" panose="020B0604020202020204" pitchFamily="34" charset="0"/>
+              <a:buChar char="•"/>
+            </a:pPr>
+            <a:endParaRPr lang="en-US" dirty="0"/>
           </a:p>
           <a:p>
             <a:pPr marL="342900" indent="-342900">
@@ -6959,11 +7675,90 @@
             </a:pPr>
             <a:r>
               <a:rPr lang="en-US" dirty="0"/>
-              <a:t>Skip the step to import a dataset </a:t>
-            </a:r>
-          </a:p>
-          <a:p>
-            <a:endParaRPr lang="en-US" dirty="0"/>
+              <a:t>[LOGIC LIAISON TEMPLATE] L2 and L3 Fact Tables: All Patients</a:t>
+            </a:r>
+          </a:p>
+          <a:p>
+            <a:pPr marL="800089" lvl="1" indent="-342900">
+              <a:buFont typeface="Arial" panose="020B0604020202020204" pitchFamily="34" charset="0"/>
+              <a:buChar char="•"/>
+            </a:pPr>
+            <a:r>
+              <a:rPr lang="en-US" dirty="0"/>
+              <a:t>This set of templates (Level 2 and Level 3 data versions) provides sample code and summary datasets including a visit-level and a patient-level table. The visit-level "all facts" table has a single row for each patient and each visit day (where any of the facts searched are found to be present). The patient-level table contains one row for each patient and a number of commonly referenced facts and indicators derived from the N3C datasets</a:t>
+            </a:r>
+          </a:p>
+          <a:p>
+            <a:pPr marL="342900" indent="-342900">
+              <a:buFont typeface="Arial" panose="020B0604020202020204" pitchFamily="34" charset="0"/>
+              <a:buChar char="•"/>
+            </a:pPr>
+            <a:r>
+              <a:rPr lang="en-US" dirty="0"/>
+              <a:t>[Logic Liaison Template] Data Density by Site and Domain</a:t>
+            </a:r>
+          </a:p>
+          <a:p>
+            <a:pPr marL="800089" lvl="1" indent="-342900">
+              <a:buFont typeface="Arial" panose="020B0604020202020204" pitchFamily="34" charset="0"/>
+              <a:buChar char="•"/>
+            </a:pPr>
+            <a:r>
+              <a:rPr lang="en-US" dirty="0"/>
+              <a:t>This template calculates the Standardized Density, Median Absolute Deviation (MAD), and Directional Median Deviations (DMD) with respect to the number of unique patient/concept/days for each of the major OMOP tables (i.e. </a:t>
+            </a:r>
+            <a:r>
+              <a:rPr lang="en-US" dirty="0" err="1"/>
+              <a:t>condition_occurrence</a:t>
+            </a:r>
+            <a:r>
+              <a:rPr lang="en-US" dirty="0"/>
+              <a:t>, </a:t>
+            </a:r>
+            <a:r>
+              <a:rPr lang="en-US" dirty="0" err="1"/>
+              <a:t>drug_exposure</a:t>
+            </a:r>
+            <a:r>
+              <a:rPr lang="en-US" dirty="0"/>
+              <a:t>, </a:t>
+            </a:r>
+            <a:r>
+              <a:rPr lang="en-US" dirty="0" err="1"/>
+              <a:t>etc</a:t>
+            </a:r>
+            <a:r>
+              <a:rPr lang="en-US" dirty="0"/>
+              <a:t>) and uses them to create a heatmap displaying how many MADs each site is from the median for each OMOP table. The template also scores the site's date shifting practices.</a:t>
+            </a:r>
+          </a:p>
+          <a:p>
+            <a:pPr marL="342900" indent="-342900">
+              <a:buFont typeface="Arial" panose="020B0604020202020204" pitchFamily="34" charset="0"/>
+              <a:buChar char="•"/>
+            </a:pPr>
+            <a:r>
+              <a:rPr lang="en-US" dirty="0"/>
+              <a:t>[Logic Liaison Template] Fact Density by Site Visualization</a:t>
+            </a:r>
+          </a:p>
+          <a:p>
+            <a:pPr marL="800089" lvl="1" indent="-342900">
+              <a:buFont typeface="Arial" panose="020B0604020202020204" pitchFamily="34" charset="0"/>
+              <a:buChar char="•"/>
+            </a:pPr>
+            <a:r>
+              <a:rPr lang="en-US" dirty="0"/>
+              <a:t>This template calculates the Standardized Density, Median Absolute Deviation (MAD), and Directional Median Deviations (DMD) with respect to the numerical values in each column of the input table (any non-numerical field is converted to a binary value using the </a:t>
+            </a:r>
+            <a:r>
+              <a:rPr lang="en-US" dirty="0" err="1"/>
+              <a:t>isNotNull</a:t>
+            </a:r>
+            <a:r>
+              <a:rPr lang="en-US" dirty="0"/>
+              <a:t>() function) and creates heatmaps to visualize the metrics.</a:t>
+            </a:r>
           </a:p>
         </p:txBody>
       </p:sp>
@@ -6972,7 +7767,7 @@
           <p:cNvPr id="4" name="Title 3">
             <a:extLst>
               <a:ext uri="{FF2B5EF4-FFF2-40B4-BE49-F238E27FC236}">
-                <a16:creationId xmlns:a16="http://schemas.microsoft.com/office/drawing/2014/main" id="{CD15B863-9CAC-E013-88E3-EEC9524BEB2C}"/>
+                <a16:creationId xmlns:a16="http://schemas.microsoft.com/office/drawing/2014/main" id="{D04F5A47-2FCD-C100-9CE8-D18E7D23B5B8}"/>
               </a:ext>
             </a:extLst>
           </p:cNvPr>
@@ -6983,14 +7778,19 @@
             <p:ph type="title"/>
           </p:nvPr>
         </p:nvSpPr>
-        <p:spPr/>
+        <p:spPr>
+          <a:xfrm>
+            <a:off x="342028" y="67875"/>
+            <a:ext cx="7887570" cy="733792"/>
+          </a:xfrm>
+        </p:spPr>
         <p:txBody>
           <a:bodyPr/>
           <a:lstStyle/>
           <a:p>
             <a:r>
               <a:rPr lang="en-US" dirty="0"/>
-              <a:t>Exercise 7 (follow along)</a:t>
+              <a:t>LL Templates</a:t>
             </a:r>
           </a:p>
         </p:txBody>
@@ -6998,7 +7798,7 @@
     </p:spTree>
     <p:extLst>
       <p:ext uri="{BB962C8B-B14F-4D97-AF65-F5344CB8AC3E}">
-        <p14:creationId xmlns:p14="http://schemas.microsoft.com/office/powerpoint/2010/main" val="2265780570"/>
+        <p14:creationId xmlns:p14="http://schemas.microsoft.com/office/powerpoint/2010/main" val="3721500001"/>
       </p:ext>
     </p:extLst>
   </p:cSld>
@@ -7030,7 +7830,7 @@
           <p:cNvPr id="2" name="Text Placeholder 1">
             <a:extLst>
               <a:ext uri="{FF2B5EF4-FFF2-40B4-BE49-F238E27FC236}">
-                <a16:creationId xmlns:a16="http://schemas.microsoft.com/office/drawing/2014/main" id="{DE002F63-BEA9-D46B-FE8E-6DA708E57BDD}"/>
+                <a16:creationId xmlns:a16="http://schemas.microsoft.com/office/drawing/2014/main" id="{94D9DFF7-7A27-61C8-6417-4AB9B6521500}"/>
               </a:ext>
             </a:extLst>
           </p:cNvPr>
@@ -7043,23 +7843,27 @@
         </p:nvSpPr>
         <p:spPr>
           <a:xfrm>
-            <a:off x="342028" y="901874"/>
-            <a:ext cx="7887570" cy="4018469"/>
+            <a:off x="342028" y="1214278"/>
+            <a:ext cx="7994043" cy="3706065"/>
           </a:xfrm>
         </p:spPr>
         <p:txBody>
-          <a:bodyPr>
-            <a:normAutofit fontScale="92500" lnSpcReduction="20000"/>
-          </a:bodyPr>
+          <a:bodyPr/>
           <a:lstStyle/>
           <a:p>
+            <a:r>
+              <a:rPr lang="en-US" dirty="0"/>
+              <a:t>Deploy the Logic Liaison Template in your student folder!</a:t>
+            </a:r>
+          </a:p>
+          <a:p>
             <a:pPr marL="342900" indent="-342900">
               <a:buFont typeface="Arial" panose="020B0604020202020204" pitchFamily="34" charset="0"/>
               <a:buChar char="•"/>
             </a:pPr>
             <a:r>
               <a:rPr lang="en-US" dirty="0"/>
-              <a:t>Open a new code workbook and select “Skip this Step” under "Import Dataset".</a:t>
+              <a:t>Create a new code workbook and name it Logic Liaison COVID Positive</a:t>
             </a:r>
           </a:p>
           <a:p>
@@ -7069,18 +7873,11 @@
             </a:pPr>
             <a:r>
               <a:rPr lang="en-US" dirty="0"/>
-              <a:t>Make sure you are using the "default" or "high-memory" environment (selected under the environment menu towards the top middle of the window: Customize Spark environment → profile-high-memory on the left panel of pop-up → Update Spark environment).</a:t>
-            </a:r>
-          </a:p>
-          <a:p>
-            <a:pPr marL="342900" indent="-342900">
-              <a:buFont typeface="Arial" panose="020B0604020202020204" pitchFamily="34" charset="0"/>
-              <a:buChar char="•"/>
-            </a:pPr>
-            <a:r>
-              <a:rPr lang="en-US" dirty="0"/>
-              <a:t>Click “New Transform”, select “Templates”, search for the “[LOGIC LIAISON TEMPLATE] L2 and L3 Fact Tables: COVID-19 Diagnosed or Lab Confirmed Patients" and import into the workbook.  When you press the ‘apply transformation’ button, a box pops up that says that there are resources within the template that are not within the scope of the project.  You can agree to add these resources. </a:t>
-            </a:r>
+              <a:t>Skip the step to import a dataset </a:t>
+            </a:r>
+          </a:p>
+          <a:p>
+            <a:endParaRPr lang="en-US" dirty="0"/>
           </a:p>
         </p:txBody>
       </p:sp>
@@ -7089,7 +7886,7 @@
           <p:cNvPr id="4" name="Title 3">
             <a:extLst>
               <a:ext uri="{FF2B5EF4-FFF2-40B4-BE49-F238E27FC236}">
-                <a16:creationId xmlns:a16="http://schemas.microsoft.com/office/drawing/2014/main" id="{6BF00A65-EA26-D7A7-3FE0-F49A0534E889}"/>
+                <a16:creationId xmlns:a16="http://schemas.microsoft.com/office/drawing/2014/main" id="{CD15B863-9CAC-E013-88E3-EEC9524BEB2C}"/>
               </a:ext>
             </a:extLst>
           </p:cNvPr>
@@ -7100,19 +7897,14 @@
             <p:ph type="title"/>
           </p:nvPr>
         </p:nvSpPr>
-        <p:spPr>
-          <a:xfrm>
-            <a:off x="342030" y="180609"/>
-            <a:ext cx="7887570" cy="545902"/>
-          </a:xfrm>
-        </p:spPr>
+        <p:spPr/>
         <p:txBody>
           <a:bodyPr/>
           <a:lstStyle/>
           <a:p>
             <a:r>
               <a:rPr lang="en-US" dirty="0"/>
-              <a:t>Importing into a Code Workbook</a:t>
+              <a:t>Exercise 7 (follow along)</a:t>
             </a:r>
           </a:p>
         </p:txBody>
@@ -7120,7 +7912,7 @@
     </p:spTree>
     <p:extLst>
       <p:ext uri="{BB962C8B-B14F-4D97-AF65-F5344CB8AC3E}">
-        <p14:creationId xmlns:p14="http://schemas.microsoft.com/office/powerpoint/2010/main" val="3156528940"/>
+        <p14:creationId xmlns:p14="http://schemas.microsoft.com/office/powerpoint/2010/main" val="2265780570"/>
       </p:ext>
     </p:extLst>
   </p:cSld>
@@ -7152,7 +7944,7 @@
           <p:cNvPr id="2" name="Text Placeholder 1">
             <a:extLst>
               <a:ext uri="{FF2B5EF4-FFF2-40B4-BE49-F238E27FC236}">
-                <a16:creationId xmlns:a16="http://schemas.microsoft.com/office/drawing/2014/main" id="{56C7373A-B96D-F459-21D4-13043C249FFB}"/>
+                <a16:creationId xmlns:a16="http://schemas.microsoft.com/office/drawing/2014/main" id="{DE002F63-BEA9-D46B-FE8E-6DA708E57BDD}"/>
               </a:ext>
             </a:extLst>
           </p:cNvPr>
@@ -7165,13 +7957,13 @@
         </p:nvSpPr>
         <p:spPr>
           <a:xfrm>
-            <a:off x="342028" y="1214278"/>
-            <a:ext cx="4126605" cy="3929222"/>
+            <a:off x="342028" y="901874"/>
+            <a:ext cx="7887570" cy="4018469"/>
           </a:xfrm>
         </p:spPr>
         <p:txBody>
           <a:bodyPr>
-            <a:normAutofit fontScale="92500"/>
+            <a:normAutofit fontScale="92500" lnSpcReduction="20000"/>
           </a:bodyPr>
           <a:lstStyle/>
           <a:p>
@@ -7181,66 +7973,37 @@
             </a:pPr>
             <a:r>
               <a:rPr lang="en-US" dirty="0"/>
-              <a:t>Update concept sets in use</a:t>
-            </a:r>
-          </a:p>
-          <a:p>
-            <a:pPr marL="800089" lvl="1" indent="-342900">
-              <a:buFont typeface="Arial" panose="020B0604020202020204" pitchFamily="34" charset="0"/>
-              <a:buChar char="•"/>
-            </a:pPr>
-            <a:r>
-              <a:rPr lang="en-US" dirty="0"/>
-              <a:t>Concepts in Use: </a:t>
-            </a:r>
-            <a:r>
-              <a:rPr lang="en-US" dirty="0">
-                <a:hlinkClick r:id="rId2"/>
-              </a:rPr>
-              <a:t>https://github.com/National-COVID-Cohort-Collaborative/short-course-2022-june/blob/main/lessons/session-3/malnutrition_concept_sets.csv</a:t>
-            </a:r>
-            <a:r>
-              <a:rPr lang="en-US"/>
-              <a:t> </a:t>
-            </a:r>
-            <a:endParaRPr lang="en-US" dirty="0"/>
-          </a:p>
-          <a:p>
-            <a:pPr marL="800089" lvl="1" indent="-342900">
-              <a:buFont typeface="Arial" panose="020B0604020202020204" pitchFamily="34" charset="0"/>
-              <a:buChar char="•"/>
-            </a:pPr>
-            <a:r>
-              <a:rPr lang="en-US" dirty="0"/>
-              <a:t>Using the “Manual entry” option in a code workbook, paste the list from GitHub and name the transformation </a:t>
-            </a:r>
-            <a:r>
-              <a:rPr lang="en-US" dirty="0" err="1"/>
-              <a:t>ll_input</a:t>
-            </a:r>
-            <a:r>
-              <a:rPr lang="en-US" dirty="0"/>
-              <a:t>. </a:t>
-            </a:r>
-          </a:p>
-          <a:p>
-            <a:pPr marL="800089" lvl="1" indent="-342900">
-              <a:buFont typeface="Arial" panose="020B0604020202020204" pitchFamily="34" charset="0"/>
-              <a:buChar char="•"/>
-            </a:pPr>
-            <a:r>
-              <a:rPr lang="en-US" dirty="0"/>
-              <a:t>Toggle “Save as dataset” and run the transform</a:t>
-            </a:r>
-          </a:p>
-        </p:txBody>
-      </p:sp>
-      <p:sp>
-        <p:nvSpPr>
-          <p:cNvPr id="3" name="Text Placeholder 2">
+              <a:t>Open a new code workbook and select “Skip this Step” under "Import Dataset".</a:t>
+            </a:r>
+          </a:p>
+          <a:p>
+            <a:pPr marL="342900" indent="-342900">
+              <a:buFont typeface="Arial" panose="020B0604020202020204" pitchFamily="34" charset="0"/>
+              <a:buChar char="•"/>
+            </a:pPr>
+            <a:r>
+              <a:rPr lang="en-US" dirty="0"/>
+              <a:t>Make sure you are using the "default" or "high-memory" environment (selected under the environment menu towards the top middle of the window: Customize Spark environment → profile-high-memory on the left panel of pop-up → Update Spark environment).</a:t>
+            </a:r>
+          </a:p>
+          <a:p>
+            <a:pPr marL="342900" indent="-342900">
+              <a:buFont typeface="Arial" panose="020B0604020202020204" pitchFamily="34" charset="0"/>
+              <a:buChar char="•"/>
+            </a:pPr>
+            <a:r>
+              <a:rPr lang="en-US" dirty="0"/>
+              <a:t>Click “New Transform”, select “Templates”, search for the “[LOGIC LIAISON TEMPLATE] L2 and L3 Fact Tables: COVID-19 Diagnosed or Lab Confirmed Patients" and import into the workbook.  When you press the ‘apply transformation’ button, a box pops up that says that there are resources within the template that are not within the scope of the project.  You can agree to add these resources. </a:t>
+            </a:r>
+          </a:p>
+        </p:txBody>
+      </p:sp>
+      <p:sp>
+        <p:nvSpPr>
+          <p:cNvPr id="4" name="Title 3">
             <a:extLst>
               <a:ext uri="{FF2B5EF4-FFF2-40B4-BE49-F238E27FC236}">
-                <a16:creationId xmlns:a16="http://schemas.microsoft.com/office/drawing/2014/main" id="{4A584CE6-A30D-A272-B251-DDE37254EB9D}"/>
+                <a16:creationId xmlns:a16="http://schemas.microsoft.com/office/drawing/2014/main" id="{6BF00A65-EA26-D7A7-3FE0-F49A0534E889}"/>
               </a:ext>
             </a:extLst>
           </p:cNvPr>
@@ -7248,173 +8011,22 @@
             <a:spLocks noGrp="1"/>
           </p:cNvSpPr>
           <p:nvPr>
-            <p:ph type="body" idx="14"/>
+            <p:ph type="title"/>
           </p:nvPr>
         </p:nvSpPr>
         <p:spPr>
           <a:xfrm>
-            <a:off x="4679846" y="1214278"/>
-            <a:ext cx="4122123" cy="3929222"/>
+            <a:off x="342030" y="180609"/>
+            <a:ext cx="7887570" cy="545902"/>
           </a:xfrm>
         </p:spPr>
         <p:txBody>
-          <a:bodyPr>
-            <a:normAutofit fontScale="85000" lnSpcReduction="10000"/>
-          </a:bodyPr>
-          <a:lstStyle/>
-          <a:p>
-            <a:pPr marL="342900" indent="-342900">
-              <a:buFont typeface="Arial" panose="020B0604020202020204" pitchFamily="34" charset="0"/>
-              <a:buChar char="•"/>
-            </a:pPr>
-            <a:r>
-              <a:rPr lang="en-US" dirty="0"/>
-              <a:t>Modifications</a:t>
-            </a:r>
-          </a:p>
-          <a:p>
-            <a:pPr marL="800089" lvl="1" indent="-342900">
-              <a:buFont typeface="Arial" panose="020B0604020202020204" pitchFamily="34" charset="0"/>
-              <a:buChar char="•"/>
-            </a:pPr>
-            <a:r>
-              <a:rPr lang="en-US" dirty="0"/>
-              <a:t>In the cohort template, change </a:t>
-            </a:r>
-            <a:r>
-              <a:rPr lang="en-US" dirty="0" err="1"/>
-              <a:t>proportion_of_patients_to_use</a:t>
-            </a:r>
-            <a:r>
-              <a:rPr lang="en-US" dirty="0"/>
-              <a:t> to 0.10. </a:t>
-            </a:r>
-          </a:p>
-          <a:p>
-            <a:pPr marL="800089" lvl="1" indent="-342900">
-              <a:buFont typeface="Arial" panose="020B0604020202020204" pitchFamily="34" charset="0"/>
-              <a:buChar char="•"/>
-            </a:pPr>
-            <a:r>
-              <a:rPr lang="en-US" dirty="0"/>
-              <a:t>Point all templates to the newly created </a:t>
-            </a:r>
-            <a:r>
-              <a:rPr lang="en-US" dirty="0" err="1"/>
-              <a:t>ll_input</a:t>
-            </a:r>
-            <a:r>
-              <a:rPr lang="en-US" dirty="0"/>
-              <a:t> under </a:t>
-            </a:r>
-            <a:r>
-              <a:rPr lang="en-US" dirty="0" err="1"/>
-              <a:t>customize_concept_sets</a:t>
-            </a:r>
-            <a:r>
-              <a:rPr lang="en-US" dirty="0"/>
-              <a:t>.</a:t>
-            </a:r>
-          </a:p>
-          <a:p>
-            <a:pPr marL="800089" lvl="1" indent="-342900">
-              <a:buFont typeface="Arial" panose="020B0604020202020204" pitchFamily="34" charset="0"/>
-              <a:buChar char="•"/>
-            </a:pPr>
-            <a:r>
-              <a:rPr lang="en-US" dirty="0"/>
-              <a:t>In </a:t>
-            </a:r>
-            <a:r>
-              <a:rPr lang="en-US" dirty="0" err="1"/>
-              <a:t>visits_of_interest</a:t>
-            </a:r>
-            <a:r>
-              <a:rPr lang="en-US" dirty="0"/>
-              <a:t> template, toggle off the </a:t>
-            </a:r>
-            <a:r>
-              <a:rPr lang="en-US" dirty="0" err="1"/>
-              <a:t>covid_associated_ED_or_hosp_requires_lab_AND_diagnosis</a:t>
-            </a:r>
-            <a:r>
-              <a:rPr lang="en-US" dirty="0"/>
-              <a:t>, change </a:t>
-            </a:r>
-            <a:r>
-              <a:rPr lang="en-US" dirty="0" err="1"/>
-              <a:t>num_days_before_index</a:t>
-            </a:r>
-            <a:r>
-              <a:rPr lang="en-US" dirty="0"/>
-              <a:t> to 14 and </a:t>
-            </a:r>
-            <a:r>
-              <a:rPr lang="en-US" dirty="0" err="1"/>
-              <a:t>num_days_after_index</a:t>
-            </a:r>
-            <a:r>
-              <a:rPr lang="en-US" dirty="0"/>
-              <a:t> to 30. </a:t>
-            </a:r>
-          </a:p>
-          <a:p>
-            <a:pPr marL="800089" lvl="1" indent="-342900">
-              <a:buFont typeface="Arial" panose="020B0604020202020204" pitchFamily="34" charset="0"/>
-              <a:buChar char="•"/>
-            </a:pPr>
-            <a:r>
-              <a:rPr lang="en-US" dirty="0"/>
-              <a:t>Save all transformation as datasets and click ”Run all saved datasets” from the cog icon at the top of the code workbook </a:t>
-            </a:r>
-          </a:p>
-          <a:p>
-            <a:pPr marL="800089" lvl="1" indent="-342900">
-              <a:buFont typeface="Arial" panose="020B0604020202020204" pitchFamily="34" charset="0"/>
-              <a:buChar char="•"/>
-            </a:pPr>
-            <a:endParaRPr lang="en-US" dirty="0"/>
-          </a:p>
-          <a:p>
-            <a:pPr marL="800089" lvl="1" indent="-342900">
-              <a:buFont typeface="Arial" panose="020B0604020202020204" pitchFamily="34" charset="0"/>
-              <a:buChar char="•"/>
-            </a:pPr>
-            <a:endParaRPr lang="en-US" dirty="0"/>
-          </a:p>
-          <a:p>
-            <a:pPr marL="800089" lvl="1" indent="-342900">
-              <a:buFont typeface="Arial" panose="020B0604020202020204" pitchFamily="34" charset="0"/>
-              <a:buChar char="•"/>
-            </a:pPr>
-            <a:endParaRPr lang="en-US" dirty="0"/>
-          </a:p>
-        </p:txBody>
-      </p:sp>
-      <p:sp>
-        <p:nvSpPr>
-          <p:cNvPr id="4" name="Title 3">
-            <a:extLst>
-              <a:ext uri="{FF2B5EF4-FFF2-40B4-BE49-F238E27FC236}">
-                <a16:creationId xmlns:a16="http://schemas.microsoft.com/office/drawing/2014/main" id="{A743D1B6-68DF-E690-17FE-C4C8FBE41331}"/>
-              </a:ext>
-            </a:extLst>
-          </p:cNvPr>
-          <p:cNvSpPr>
-            <a:spLocks noGrp="1"/>
-          </p:cNvSpPr>
-          <p:nvPr>
-            <p:ph type="title"/>
-          </p:nvPr>
-        </p:nvSpPr>
-        <p:spPr/>
-        <p:txBody>
           <a:bodyPr/>
           <a:lstStyle/>
           <a:p>
             <a:r>
               <a:rPr lang="en-US" dirty="0"/>
-              <a:t>Required Modifications for Malnutrition Study</a:t>
+              <a:t>Importing into a Code Workbook</a:t>
             </a:r>
           </a:p>
         </p:txBody>
@@ -7422,7 +8034,7 @@
     </p:spTree>
     <p:extLst>
       <p:ext uri="{BB962C8B-B14F-4D97-AF65-F5344CB8AC3E}">
-        <p14:creationId xmlns:p14="http://schemas.microsoft.com/office/powerpoint/2010/main" val="1942087167"/>
+        <p14:creationId xmlns:p14="http://schemas.microsoft.com/office/powerpoint/2010/main" val="3156528940"/>
       </p:ext>
     </p:extLst>
   </p:cSld>
@@ -7454,6 +8066,307 @@
           <p:cNvPr id="2" name="Text Placeholder 1">
             <a:extLst>
               <a:ext uri="{FF2B5EF4-FFF2-40B4-BE49-F238E27FC236}">
+                <a16:creationId xmlns:a16="http://schemas.microsoft.com/office/drawing/2014/main" id="{56C7373A-B96D-F459-21D4-13043C249FFB}"/>
+              </a:ext>
+            </a:extLst>
+          </p:cNvPr>
+          <p:cNvSpPr>
+            <a:spLocks noGrp="1"/>
+          </p:cNvSpPr>
+          <p:nvPr>
+            <p:ph type="body" idx="1"/>
+          </p:nvPr>
+        </p:nvSpPr>
+        <p:spPr>
+          <a:xfrm>
+            <a:off x="342028" y="1214278"/>
+            <a:ext cx="4126605" cy="3929222"/>
+          </a:xfrm>
+        </p:spPr>
+        <p:txBody>
+          <a:bodyPr>
+            <a:normAutofit fontScale="92500"/>
+          </a:bodyPr>
+          <a:lstStyle/>
+          <a:p>
+            <a:pPr marL="342900" indent="-342900">
+              <a:buFont typeface="Arial" panose="020B0604020202020204" pitchFamily="34" charset="0"/>
+              <a:buChar char="•"/>
+            </a:pPr>
+            <a:r>
+              <a:rPr lang="en-US" dirty="0"/>
+              <a:t>Update concept sets in use</a:t>
+            </a:r>
+          </a:p>
+          <a:p>
+            <a:pPr marL="800089" lvl="1" indent="-342900">
+              <a:buFont typeface="Arial" panose="020B0604020202020204" pitchFamily="34" charset="0"/>
+              <a:buChar char="•"/>
+            </a:pPr>
+            <a:r>
+              <a:rPr lang="en-US" dirty="0"/>
+              <a:t>Concepts in Use: </a:t>
+            </a:r>
+            <a:r>
+              <a:rPr lang="en-US" dirty="0">
+                <a:hlinkClick r:id="rId2"/>
+              </a:rPr>
+              <a:t>https://github.com/National-COVID-Cohort-Collaborative/short-course-2022-june/blob/main/lessons/session-3/malnutrition_concept_sets.csv</a:t>
+            </a:r>
+            <a:r>
+              <a:rPr lang="en-US" dirty="0"/>
+              <a:t> </a:t>
+            </a:r>
+          </a:p>
+          <a:p>
+            <a:pPr marL="800089" lvl="1" indent="-342900">
+              <a:buFont typeface="Arial" panose="020B0604020202020204" pitchFamily="34" charset="0"/>
+              <a:buChar char="•"/>
+            </a:pPr>
+            <a:r>
+              <a:rPr lang="en-US" dirty="0"/>
+              <a:t>Using the “Manual entry” option in a code workbook, paste the list from GitHub and name the transformation </a:t>
+            </a:r>
+            <a:r>
+              <a:rPr lang="en-US" dirty="0" err="1"/>
+              <a:t>ll_input</a:t>
+            </a:r>
+            <a:r>
+              <a:rPr lang="en-US" dirty="0"/>
+              <a:t>. </a:t>
+            </a:r>
+          </a:p>
+          <a:p>
+            <a:pPr marL="800089" lvl="1" indent="-342900">
+              <a:buFont typeface="Arial" panose="020B0604020202020204" pitchFamily="34" charset="0"/>
+              <a:buChar char="•"/>
+            </a:pPr>
+            <a:r>
+              <a:rPr lang="en-US" dirty="0"/>
+              <a:t>Toggle “Save as dataset” and run the transform</a:t>
+            </a:r>
+          </a:p>
+        </p:txBody>
+      </p:sp>
+      <p:sp>
+        <p:nvSpPr>
+          <p:cNvPr id="3" name="Text Placeholder 2">
+            <a:extLst>
+              <a:ext uri="{FF2B5EF4-FFF2-40B4-BE49-F238E27FC236}">
+                <a16:creationId xmlns:a16="http://schemas.microsoft.com/office/drawing/2014/main" id="{4A584CE6-A30D-A272-B251-DDE37254EB9D}"/>
+              </a:ext>
+            </a:extLst>
+          </p:cNvPr>
+          <p:cNvSpPr>
+            <a:spLocks noGrp="1"/>
+          </p:cNvSpPr>
+          <p:nvPr>
+            <p:ph type="body" idx="14"/>
+          </p:nvPr>
+        </p:nvSpPr>
+        <p:spPr>
+          <a:xfrm>
+            <a:off x="4679846" y="1214278"/>
+            <a:ext cx="4122123" cy="3929222"/>
+          </a:xfrm>
+        </p:spPr>
+        <p:txBody>
+          <a:bodyPr>
+            <a:normAutofit fontScale="85000" lnSpcReduction="10000"/>
+          </a:bodyPr>
+          <a:lstStyle/>
+          <a:p>
+            <a:pPr marL="342900" indent="-342900">
+              <a:buFont typeface="Arial" panose="020B0604020202020204" pitchFamily="34" charset="0"/>
+              <a:buChar char="•"/>
+            </a:pPr>
+            <a:r>
+              <a:rPr lang="en-US" dirty="0"/>
+              <a:t>Modifications</a:t>
+            </a:r>
+          </a:p>
+          <a:p>
+            <a:pPr marL="800089" lvl="1" indent="-342900">
+              <a:buFont typeface="Arial" panose="020B0604020202020204" pitchFamily="34" charset="0"/>
+              <a:buChar char="•"/>
+            </a:pPr>
+            <a:r>
+              <a:rPr lang="en-US" dirty="0"/>
+              <a:t>In the cohort template, change </a:t>
+            </a:r>
+            <a:r>
+              <a:rPr lang="en-US" dirty="0" err="1"/>
+              <a:t>proportion_of_patients_to_use</a:t>
+            </a:r>
+            <a:r>
+              <a:rPr lang="en-US" dirty="0"/>
+              <a:t> to 0.10. </a:t>
+            </a:r>
+          </a:p>
+          <a:p>
+            <a:pPr marL="800089" lvl="1" indent="-342900">
+              <a:buFont typeface="Arial" panose="020B0604020202020204" pitchFamily="34" charset="0"/>
+              <a:buChar char="•"/>
+            </a:pPr>
+            <a:r>
+              <a:rPr lang="en-US" dirty="0"/>
+              <a:t>Point all templates to the newly created </a:t>
+            </a:r>
+            <a:r>
+              <a:rPr lang="en-US" dirty="0" err="1"/>
+              <a:t>ll_input</a:t>
+            </a:r>
+            <a:r>
+              <a:rPr lang="en-US" dirty="0"/>
+              <a:t> under </a:t>
+            </a:r>
+            <a:r>
+              <a:rPr lang="en-US" dirty="0" err="1"/>
+              <a:t>customize_concept_sets</a:t>
+            </a:r>
+            <a:r>
+              <a:rPr lang="en-US" dirty="0"/>
+              <a:t>.</a:t>
+            </a:r>
+          </a:p>
+          <a:p>
+            <a:pPr marL="800089" lvl="1" indent="-342900">
+              <a:buFont typeface="Arial" panose="020B0604020202020204" pitchFamily="34" charset="0"/>
+              <a:buChar char="•"/>
+            </a:pPr>
+            <a:r>
+              <a:rPr lang="en-US" dirty="0"/>
+              <a:t>In </a:t>
+            </a:r>
+            <a:r>
+              <a:rPr lang="en-US" dirty="0" err="1"/>
+              <a:t>visits_of_interest</a:t>
+            </a:r>
+            <a:r>
+              <a:rPr lang="en-US" dirty="0"/>
+              <a:t> template, toggle off the </a:t>
+            </a:r>
+            <a:r>
+              <a:rPr lang="en-US" dirty="0" err="1"/>
+              <a:t>covid_associated_ED_or_hosp_requires_lab_AND_diagnosis</a:t>
+            </a:r>
+            <a:r>
+              <a:rPr lang="en-US" dirty="0"/>
+              <a:t>, change </a:t>
+            </a:r>
+            <a:r>
+              <a:rPr lang="en-US" dirty="0" err="1"/>
+              <a:t>num_days_before_index</a:t>
+            </a:r>
+            <a:r>
+              <a:rPr lang="en-US" dirty="0"/>
+              <a:t> to 3 and </a:t>
+            </a:r>
+            <a:r>
+              <a:rPr lang="en-US" dirty="0" err="1"/>
+              <a:t>num_days_after_index</a:t>
+            </a:r>
+            <a:r>
+              <a:rPr lang="en-US" dirty="0"/>
+              <a:t> to 14. </a:t>
+            </a:r>
+          </a:p>
+          <a:p>
+            <a:pPr marL="800089" lvl="1" indent="-342900">
+              <a:buFont typeface="Arial" panose="020B0604020202020204" pitchFamily="34" charset="0"/>
+              <a:buChar char="•"/>
+            </a:pPr>
+            <a:r>
+              <a:rPr lang="en-US" dirty="0"/>
+              <a:t>Save all transformation as datasets and click ”Run all saved datasets” from the cog icon at the top of the code workbook </a:t>
+            </a:r>
+          </a:p>
+          <a:p>
+            <a:pPr marL="800089" lvl="1" indent="-342900">
+              <a:buFont typeface="Arial" panose="020B0604020202020204" pitchFamily="34" charset="0"/>
+              <a:buChar char="•"/>
+            </a:pPr>
+            <a:endParaRPr lang="en-US" dirty="0"/>
+          </a:p>
+          <a:p>
+            <a:pPr marL="800089" lvl="1" indent="-342900">
+              <a:buFont typeface="Arial" panose="020B0604020202020204" pitchFamily="34" charset="0"/>
+              <a:buChar char="•"/>
+            </a:pPr>
+            <a:endParaRPr lang="en-US" dirty="0"/>
+          </a:p>
+          <a:p>
+            <a:pPr marL="800089" lvl="1" indent="-342900">
+              <a:buFont typeface="Arial" panose="020B0604020202020204" pitchFamily="34" charset="0"/>
+              <a:buChar char="•"/>
+            </a:pPr>
+            <a:endParaRPr lang="en-US" dirty="0"/>
+          </a:p>
+        </p:txBody>
+      </p:sp>
+      <p:sp>
+        <p:nvSpPr>
+          <p:cNvPr id="4" name="Title 3">
+            <a:extLst>
+              <a:ext uri="{FF2B5EF4-FFF2-40B4-BE49-F238E27FC236}">
+                <a16:creationId xmlns:a16="http://schemas.microsoft.com/office/drawing/2014/main" id="{A743D1B6-68DF-E690-17FE-C4C8FBE41331}"/>
+              </a:ext>
+            </a:extLst>
+          </p:cNvPr>
+          <p:cNvSpPr>
+            <a:spLocks noGrp="1"/>
+          </p:cNvSpPr>
+          <p:nvPr>
+            <p:ph type="title"/>
+          </p:nvPr>
+        </p:nvSpPr>
+        <p:spPr/>
+        <p:txBody>
+          <a:bodyPr/>
+          <a:lstStyle/>
+          <a:p>
+            <a:r>
+              <a:rPr lang="en-US" dirty="0"/>
+              <a:t>Required Modifications for Malnutrition Study</a:t>
+            </a:r>
+          </a:p>
+        </p:txBody>
+      </p:sp>
+    </p:spTree>
+    <p:extLst>
+      <p:ext uri="{BB962C8B-B14F-4D97-AF65-F5344CB8AC3E}">
+        <p14:creationId xmlns:p14="http://schemas.microsoft.com/office/powerpoint/2010/main" val="1942087167"/>
+      </p:ext>
+    </p:extLst>
+  </p:cSld>
+  <p:clrMapOvr>
+    <a:masterClrMapping/>
+  </p:clrMapOvr>
+</p:sld>
+</file>
+
+<file path=ppt/slides/slide37.xml><?xml version="1.0" encoding="utf-8"?>
+<p:sld xmlns:a="http://schemas.openxmlformats.org/drawingml/2006/main" xmlns:r="http://schemas.openxmlformats.org/officeDocument/2006/relationships" xmlns:p="http://schemas.openxmlformats.org/presentationml/2006/main">
+  <p:cSld>
+    <p:spTree>
+      <p:nvGrpSpPr>
+        <p:cNvPr id="1" name=""/>
+        <p:cNvGrpSpPr/>
+        <p:nvPr/>
+      </p:nvGrpSpPr>
+      <p:grpSpPr>
+        <a:xfrm>
+          <a:off x="0" y="0"/>
+          <a:ext cx="0" cy="0"/>
+          <a:chOff x="0" y="0"/>
+          <a:chExt cx="0" cy="0"/>
+        </a:xfrm>
+      </p:grpSpPr>
+      <p:sp>
+        <p:nvSpPr>
+          <p:cNvPr id="2" name="Text Placeholder 1">
+            <a:extLst>
+              <a:ext uri="{FF2B5EF4-FFF2-40B4-BE49-F238E27FC236}">
                 <a16:creationId xmlns:a16="http://schemas.microsoft.com/office/drawing/2014/main" id="{7FC0C117-41E4-4DA6-F805-B4EA95633641}"/>
               </a:ext>
             </a:extLst>
@@ -7568,7 +8481,7 @@
 </p:sld>
 </file>
 
-<file path=ppt/slides/slide37.xml><?xml version="1.0" encoding="utf-8"?>
+<file path=ppt/slides/slide38.xml><?xml version="1.0" encoding="utf-8"?>
 <p:sld xmlns:a="http://schemas.openxmlformats.org/drawingml/2006/main" xmlns:r="http://schemas.openxmlformats.org/officeDocument/2006/relationships" xmlns:p="http://schemas.openxmlformats.org/presentationml/2006/main">
   <p:cSld>
     <p:spTree>
@@ -8043,7 +8956,7 @@
         <p:spPr>
           <a:xfrm>
             <a:off x="1587641" y="3224721"/>
-            <a:ext cx="2642583" cy="369332"/>
+            <a:ext cx="2762023" cy="923330"/>
           </a:xfrm>
           <a:prstGeom prst="rect">
             <a:avLst/>
@@ -8051,7 +8964,7 @@
           <a:noFill/>
         </p:spPr>
         <p:txBody>
-          <a:bodyPr wrap="none" rtlCol="0">
+          <a:bodyPr wrap="square" rtlCol="0">
             <a:spAutoFit/>
           </a:bodyPr>
           <a:lstStyle/>
@@ -8059,6 +8972,20 @@
             <a:r>
               <a:rPr lang="en-US" dirty="0"/>
               <a:t>James McClay, MD, MS</a:t>
+            </a:r>
+          </a:p>
+          <a:p>
+            <a:r>
+              <a:rPr lang="en-US" dirty="0"/>
+              <a:t>Greater N3C Community (</a:t>
+            </a:r>
+            <a:r>
+              <a:rPr lang="en-US" dirty="0" err="1"/>
+              <a:t>Davera</a:t>
+            </a:r>
+            <a:r>
+              <a:rPr lang="en-US" dirty="0"/>
+              <a:t> Gabriel, etc.)</a:t>
             </a:r>
           </a:p>
         </p:txBody>
@@ -8973,7 +9900,7 @@
           <p:nvPr/>
         </p:nvPicPr>
         <p:blipFill>
-          <a:blip r:embed="rId2">
+          <a:blip r:embed="rId3">
             <a:extLst>
               <a:ext uri="{28A0092B-C50C-407E-A947-70E740481C1C}">
                 <a14:useLocalDpi xmlns:a14="http://schemas.microsoft.com/office/drawing/2010/main" val="0"/>
@@ -9078,7 +10005,7 @@
           <p:nvPr/>
         </p:nvPicPr>
         <p:blipFill>
-          <a:blip r:embed="rId2">
+          <a:blip r:embed="rId3">
             <a:extLst>
               <a:ext uri="{28A0092B-C50C-407E-A947-70E740481C1C}">
                 <a14:useLocalDpi xmlns:a14="http://schemas.microsoft.com/office/drawing/2010/main" val="0"/>

</xml_diff>